<commit_message>
Sass hello world demo und mixin vs extend erstellt.
</commit_message>
<xml_diff>
--- a/sassSchulung.pptx
+++ b/sassSchulung.pptx
@@ -14,26 +14,30 @@
     <p:sldId id="264" r:id="rId8"/>
     <p:sldId id="265" r:id="rId9"/>
     <p:sldId id="261" r:id="rId10"/>
-    <p:sldId id="266" r:id="rId11"/>
-    <p:sldId id="267" r:id="rId12"/>
-    <p:sldId id="268" r:id="rId13"/>
-    <p:sldId id="269" r:id="rId14"/>
-    <p:sldId id="270" r:id="rId15"/>
-    <p:sldId id="271" r:id="rId16"/>
-    <p:sldId id="272" r:id="rId17"/>
-    <p:sldId id="273" r:id="rId18"/>
-    <p:sldId id="274" r:id="rId19"/>
-    <p:sldId id="275" r:id="rId20"/>
-    <p:sldId id="276" r:id="rId21"/>
-    <p:sldId id="278" r:id="rId22"/>
-    <p:sldId id="279" r:id="rId23"/>
-    <p:sldId id="280" r:id="rId24"/>
-    <p:sldId id="281" r:id="rId25"/>
-    <p:sldId id="282" r:id="rId26"/>
-    <p:sldId id="283" r:id="rId27"/>
-    <p:sldId id="284" r:id="rId28"/>
-    <p:sldId id="285" r:id="rId29"/>
-    <p:sldId id="277" r:id="rId30"/>
+    <p:sldId id="286" r:id="rId11"/>
+    <p:sldId id="266" r:id="rId12"/>
+    <p:sldId id="267" r:id="rId13"/>
+    <p:sldId id="268" r:id="rId14"/>
+    <p:sldId id="269" r:id="rId15"/>
+    <p:sldId id="270" r:id="rId16"/>
+    <p:sldId id="271" r:id="rId17"/>
+    <p:sldId id="272" r:id="rId18"/>
+    <p:sldId id="273" r:id="rId19"/>
+    <p:sldId id="274" r:id="rId20"/>
+    <p:sldId id="275" r:id="rId21"/>
+    <p:sldId id="276" r:id="rId22"/>
+    <p:sldId id="278" r:id="rId23"/>
+    <p:sldId id="279" r:id="rId24"/>
+    <p:sldId id="280" r:id="rId25"/>
+    <p:sldId id="281" r:id="rId26"/>
+    <p:sldId id="282" r:id="rId27"/>
+    <p:sldId id="283" r:id="rId28"/>
+    <p:sldId id="284" r:id="rId29"/>
+    <p:sldId id="287" r:id="rId30"/>
+    <p:sldId id="285" r:id="rId31"/>
+    <p:sldId id="288" r:id="rId32"/>
+    <p:sldId id="289" r:id="rId33"/>
+    <p:sldId id="277" r:id="rId34"/>
   </p:sldIdLst>
   <p:sldSz cx="12192000" cy="6858000"/>
   <p:notesSz cx="6858000" cy="9144000"/>
@@ -414,7 +418,7 @@
           <a:p>
             <a:fld id="{78ABE3C1-DBE1-495D-B57B-2849774B866A}" type="datetimeFigureOut">
               <a:rPr lang="en-US" dirty="0"/>
-              <a:t>3/28/19</a:t>
+              <a:t>3/30/19</a:t>
             </a:fld>
             <a:endParaRPr lang="en-US" dirty="0"/>
           </a:p>
@@ -461,7 +465,7 @@
           <a:p>
             <a:fld id="{6D22F896-40B5-4ADD-8801-0D06FADFA095}" type="slidenum">
               <a:rPr lang="en-US" dirty="0"/>
-              <a:t>‹#›</a:t>
+              <a:t>‹Nr.›</a:t>
             </a:fld>
             <a:endParaRPr lang="en-US" dirty="0"/>
           </a:p>
@@ -828,7 +832,7 @@
           <a:p>
             <a:fld id="{446C117F-5CCF-4837-BE5F-2B92066CAFAF}" type="datetimeFigureOut">
               <a:rPr lang="en-US" dirty="0"/>
-              <a:t>3/28/19</a:t>
+              <a:t>3/30/19</a:t>
             </a:fld>
             <a:endParaRPr lang="en-US" dirty="0"/>
           </a:p>
@@ -875,7 +879,7 @@
           <a:p>
             <a:fld id="{6D22F896-40B5-4ADD-8801-0D06FADFA095}" type="slidenum">
               <a:rPr lang="en-US" dirty="0"/>
-              <a:t>‹#›</a:t>
+              <a:t>‹Nr.›</a:t>
             </a:fld>
             <a:endParaRPr lang="en-US" dirty="0"/>
           </a:p>
@@ -1164,7 +1168,7 @@
           <a:p>
             <a:fld id="{84EB90BD-B6CE-46B7-997F-7313B992CCDC}" type="datetimeFigureOut">
               <a:rPr lang="en-US" dirty="0"/>
-              <a:t>3/28/19</a:t>
+              <a:t>3/30/19</a:t>
             </a:fld>
             <a:endParaRPr lang="en-US" dirty="0"/>
           </a:p>
@@ -1211,7 +1215,7 @@
           <a:p>
             <a:fld id="{6D22F896-40B5-4ADD-8801-0D06FADFA095}" type="slidenum">
               <a:rPr lang="en-US" dirty="0"/>
-              <a:t>‹#›</a:t>
+              <a:t>‹Nr.›</a:t>
             </a:fld>
             <a:endParaRPr lang="en-US" dirty="0"/>
           </a:p>
@@ -1574,7 +1578,7 @@
           <a:p>
             <a:fld id="{CDB9D11F-B188-461D-B23F-39381795C052}" type="datetimeFigureOut">
               <a:rPr lang="en-US" dirty="0"/>
-              <a:t>3/28/19</a:t>
+              <a:t>3/30/19</a:t>
             </a:fld>
             <a:endParaRPr lang="en-US" dirty="0"/>
           </a:p>
@@ -1621,7 +1625,7 @@
           <a:p>
             <a:fld id="{6D22F896-40B5-4ADD-8801-0D06FADFA095}" type="slidenum">
               <a:rPr lang="en-US" dirty="0"/>
-              <a:t>‹#›</a:t>
+              <a:t>‹Nr.›</a:t>
             </a:fld>
             <a:endParaRPr lang="en-US" dirty="0"/>
           </a:p>
@@ -2142,7 +2146,7 @@
           <a:p>
             <a:fld id="{52E6D8D9-55A2-4063-B0F3-121F44549695}" type="datetimeFigureOut">
               <a:rPr lang="en-US" dirty="0"/>
-              <a:t>3/28/19</a:t>
+              <a:t>3/30/19</a:t>
             </a:fld>
             <a:endParaRPr lang="en-US" dirty="0"/>
           </a:p>
@@ -2189,7 +2193,7 @@
           <a:p>
             <a:fld id="{6D22F896-40B5-4ADD-8801-0D06FADFA095}" type="slidenum">
               <a:rPr lang="en-US" dirty="0"/>
-              <a:t>‹#›</a:t>
+              <a:t>‹Nr.›</a:t>
             </a:fld>
             <a:endParaRPr lang="en-US" dirty="0"/>
           </a:p>
@@ -2848,7 +2852,7 @@
           <a:p>
             <a:fld id="{D4B24536-994D-4021-A283-9F449C0DB509}" type="datetimeFigureOut">
               <a:rPr lang="en-US" dirty="0"/>
-              <a:t>3/28/19</a:t>
+              <a:t>3/30/19</a:t>
             </a:fld>
             <a:endParaRPr lang="en-US" dirty="0"/>
           </a:p>
@@ -2890,7 +2894,7 @@
           <a:p>
             <a:fld id="{6D22F896-40B5-4ADD-8801-0D06FADFA095}" type="slidenum">
               <a:rPr lang="en-US" dirty="0"/>
-              <a:t>‹#›</a:t>
+              <a:t>‹Nr.›</a:t>
             </a:fld>
             <a:endParaRPr lang="en-US" dirty="0"/>
           </a:p>
@@ -3786,7 +3790,7 @@
           <a:p>
             <a:fld id="{3CBBBB78-C96F-47B7-AB17-D852CA960AC9}" type="datetimeFigureOut">
               <a:rPr lang="en-US" dirty="0"/>
-              <a:t>3/28/19</a:t>
+              <a:t>3/30/19</a:t>
             </a:fld>
             <a:endParaRPr lang="en-US" dirty="0"/>
           </a:p>
@@ -3828,7 +3832,7 @@
           <a:p>
             <a:fld id="{6D22F896-40B5-4ADD-8801-0D06FADFA095}" type="slidenum">
               <a:rPr lang="en-US" dirty="0"/>
-              <a:t>‹#›</a:t>
+              <a:t>‹Nr.›</a:t>
             </a:fld>
             <a:endParaRPr lang="en-US" dirty="0"/>
           </a:p>
@@ -4070,7 +4074,7 @@
           <a:p>
             <a:fld id="{1FA3F48C-C7C6-4055-9F49-3777875E72AE}" type="datetimeFigureOut">
               <a:rPr lang="en-US" dirty="0"/>
-              <a:t>3/28/19</a:t>
+              <a:t>3/30/19</a:t>
             </a:fld>
             <a:endParaRPr lang="en-US" dirty="0"/>
           </a:p>
@@ -4112,7 +4116,7 @@
           <a:p>
             <a:fld id="{6D22F896-40B5-4ADD-8801-0D06FADFA095}" type="slidenum">
               <a:rPr lang="en-US" dirty="0"/>
-              <a:t>‹#›</a:t>
+              <a:t>‹Nr.›</a:t>
             </a:fld>
             <a:endParaRPr lang="en-US" dirty="0"/>
           </a:p>
@@ -4305,7 +4309,7 @@
           <a:p>
             <a:fld id="{6178E61D-D431-422C-9764-11DAFE33AB63}" type="datetimeFigureOut">
               <a:rPr lang="en-US" dirty="0"/>
-              <a:t>3/28/19</a:t>
+              <a:t>3/30/19</a:t>
             </a:fld>
             <a:endParaRPr lang="en-US" dirty="0"/>
           </a:p>
@@ -4362,7 +4366,7 @@
             <a:fld id="{6D22F896-40B5-4ADD-8801-0D06FADFA095}" type="slidenum">
               <a:rPr lang="en-US" dirty="0"/>
               <a:pPr/>
-              <a:t>‹#›</a:t>
+              <a:t>‹Nr.›</a:t>
             </a:fld>
             <a:endParaRPr lang="en-US" dirty="0"/>
           </a:p>
@@ -4600,7 +4604,7 @@
           <a:p>
             <a:fld id="{12DE42F4-6EEF-4EF7-8ED4-2208F0F89A08}" type="datetimeFigureOut">
               <a:rPr lang="en-US" dirty="0"/>
-              <a:t>3/28/19</a:t>
+              <a:t>3/30/19</a:t>
             </a:fld>
             <a:endParaRPr lang="en-US" dirty="0"/>
           </a:p>
@@ -4642,7 +4646,7 @@
           <a:p>
             <a:fld id="{6D22F896-40B5-4ADD-8801-0D06FADFA095}" type="slidenum">
               <a:rPr lang="en-US" dirty="0"/>
-              <a:t>‹#›</a:t>
+              <a:t>‹Nr.›</a:t>
             </a:fld>
             <a:endParaRPr lang="en-US" dirty="0"/>
           </a:p>
@@ -4989,7 +4993,7 @@
           <a:p>
             <a:fld id="{30578ACC-22D6-47C1-A373-4FD133E34F3C}" type="datetimeFigureOut">
               <a:rPr lang="en-US" dirty="0"/>
-              <a:t>3/28/19</a:t>
+              <a:t>3/30/19</a:t>
             </a:fld>
             <a:endParaRPr lang="en-US" dirty="0"/>
           </a:p>
@@ -5036,7 +5040,7 @@
           <a:p>
             <a:fld id="{6D22F896-40B5-4ADD-8801-0D06FADFA095}" type="slidenum">
               <a:rPr lang="en-US" dirty="0"/>
-              <a:t>‹#›</a:t>
+              <a:t>‹Nr.›</a:t>
             </a:fld>
             <a:endParaRPr lang="en-US" dirty="0"/>
           </a:p>
@@ -5312,7 +5316,7 @@
           <a:p>
             <a:fld id="{4E5A6C69-6797-4E8A-BF37-F2C3751466E9}" type="datetimeFigureOut">
               <a:rPr lang="en-US" dirty="0"/>
-              <a:t>3/28/19</a:t>
+              <a:t>3/30/19</a:t>
             </a:fld>
             <a:endParaRPr lang="en-US" dirty="0"/>
           </a:p>
@@ -5354,7 +5358,7 @@
           <a:p>
             <a:fld id="{6D22F896-40B5-4ADD-8801-0D06FADFA095}" type="slidenum">
               <a:rPr lang="en-US" dirty="0"/>
-              <a:t>‹#›</a:t>
+              <a:t>‹Nr.›</a:t>
             </a:fld>
             <a:endParaRPr lang="en-US" dirty="0"/>
           </a:p>
@@ -5775,7 +5779,7 @@
           <a:p>
             <a:fld id="{D82014A1-A632-4878-A0D3-F52BA7563730}" type="datetimeFigureOut">
               <a:rPr lang="en-US" dirty="0"/>
-              <a:t>3/28/19</a:t>
+              <a:t>3/30/19</a:t>
             </a:fld>
             <a:endParaRPr lang="en-US" dirty="0"/>
           </a:p>
@@ -5817,7 +5821,7 @@
           <a:p>
             <a:fld id="{6D22F896-40B5-4ADD-8801-0D06FADFA095}" type="slidenum">
               <a:rPr lang="en-US" dirty="0"/>
-              <a:t>‹#›</a:t>
+              <a:t>‹Nr.›</a:t>
             </a:fld>
             <a:endParaRPr lang="en-US" dirty="0"/>
           </a:p>
@@ -6027,7 +6031,7 @@
           <a:p>
             <a:fld id="{CE99F462-093F-4566-844B-4C71F2739DA5}" type="datetimeFigureOut">
               <a:rPr lang="en-US" dirty="0"/>
-              <a:t>3/28/19</a:t>
+              <a:t>3/30/19</a:t>
             </a:fld>
             <a:endParaRPr lang="en-US" dirty="0"/>
           </a:p>
@@ -6069,7 +6073,7 @@
           <a:p>
             <a:fld id="{6D22F896-40B5-4ADD-8801-0D06FADFA095}" type="slidenum">
               <a:rPr lang="en-US" dirty="0"/>
-              <a:t>‹#›</a:t>
+              <a:t>‹Nr.›</a:t>
             </a:fld>
             <a:endParaRPr lang="en-US" dirty="0"/>
           </a:p>
@@ -6185,7 +6189,7 @@
           <a:p>
             <a:fld id="{3D24A7AC-904D-4781-85BA-7D10C17ED021}" type="datetimeFigureOut">
               <a:rPr lang="en-US" dirty="0"/>
-              <a:t>3/28/19</a:t>
+              <a:t>3/30/19</a:t>
             </a:fld>
             <a:endParaRPr lang="en-US" dirty="0"/>
           </a:p>
@@ -6227,7 +6231,7 @@
           <a:p>
             <a:fld id="{6D22F896-40B5-4ADD-8801-0D06FADFA095}" type="slidenum">
               <a:rPr lang="en-US" dirty="0"/>
-              <a:t>‹#›</a:t>
+              <a:t>‹Nr.›</a:t>
             </a:fld>
             <a:endParaRPr lang="en-US" dirty="0"/>
           </a:p>
@@ -6551,7 +6555,7 @@
           <a:p>
             <a:fld id="{E331444B-B92B-4E27-8C94-BB93EAF5CB18}" type="datetimeFigureOut">
               <a:rPr lang="en-US" dirty="0"/>
-              <a:t>3/28/19</a:t>
+              <a:t>3/30/19</a:t>
             </a:fld>
             <a:endParaRPr lang="en-US" dirty="0"/>
           </a:p>
@@ -6593,7 +6597,7 @@
           <a:p>
             <a:fld id="{6D22F896-40B5-4ADD-8801-0D06FADFA095}" type="slidenum">
               <a:rPr lang="en-US" dirty="0"/>
-              <a:t>‹#›</a:t>
+              <a:t>‹Nr.›</a:t>
             </a:fld>
             <a:endParaRPr lang="en-US" dirty="0"/>
           </a:p>
@@ -6960,7 +6964,7 @@
           <a:p>
             <a:fld id="{363EFA5E-FA76-400D-B3DC-F0BA90E6D107}" type="datetimeFigureOut">
               <a:rPr lang="en-US" dirty="0"/>
-              <a:t>3/28/19</a:t>
+              <a:t>3/30/19</a:t>
             </a:fld>
             <a:endParaRPr lang="en-US" dirty="0"/>
           </a:p>
@@ -7002,7 +7006,7 @@
           <a:p>
             <a:fld id="{6D22F896-40B5-4ADD-8801-0D06FADFA095}" type="slidenum">
               <a:rPr lang="en-US" dirty="0"/>
-              <a:t>‹#›</a:t>
+              <a:t>‹Nr.›</a:t>
             </a:fld>
             <a:endParaRPr lang="en-US" dirty="0"/>
           </a:p>
@@ -7175,7 +7179,7 @@
           <a:p>
             <a:fld id="{9D6E9DEC-419B-4CC5-A080-3B06BD5A8291}" type="datetimeFigureOut">
               <a:rPr lang="en-US" dirty="0"/>
-              <a:t>3/28/19</a:t>
+              <a:t>3/30/19</a:t>
             </a:fld>
             <a:endParaRPr lang="en-US" dirty="0"/>
           </a:p>
@@ -7254,7 +7258,7 @@
             <a:fld id="{6D22F896-40B5-4ADD-8801-0D06FADFA095}" type="slidenum">
               <a:rPr lang="en-US" dirty="0"/>
               <a:pPr/>
-              <a:t>‹#›</a:t>
+              <a:t>‹Nr.›</a:t>
             </a:fld>
             <a:endParaRPr lang="en-US" dirty="0"/>
           </a:p>
@@ -7684,6 +7688,107 @@
       </p:grpSpPr>
       <p:sp>
         <p:nvSpPr>
+          <p:cNvPr id="2" name="Titel 1">
+            <a:extLst>
+              <a:ext uri="{FF2B5EF4-FFF2-40B4-BE49-F238E27FC236}">
+                <a16:creationId xmlns:a16="http://schemas.microsoft.com/office/drawing/2014/main" id="{08C072B2-EBB5-B245-AEB0-5C806DF04C2B}"/>
+              </a:ext>
+            </a:extLst>
+          </p:cNvPr>
+          <p:cNvSpPr>
+            <a:spLocks noGrp="1"/>
+          </p:cNvSpPr>
+          <p:nvPr>
+            <p:ph type="title"/>
+          </p:nvPr>
+        </p:nvSpPr>
+        <p:spPr/>
+        <p:txBody>
+          <a:bodyPr/>
+          <a:lstStyle/>
+          <a:p>
+            <a:r>
+              <a:rPr lang="de-DE" dirty="0"/>
+              <a:t>Verschachtelung</a:t>
+            </a:r>
+          </a:p>
+        </p:txBody>
+      </p:sp>
+      <p:sp>
+        <p:nvSpPr>
+          <p:cNvPr id="3" name="Inhaltsplatzhalter 2">
+            <a:extLst>
+              <a:ext uri="{FF2B5EF4-FFF2-40B4-BE49-F238E27FC236}">
+                <a16:creationId xmlns:a16="http://schemas.microsoft.com/office/drawing/2014/main" id="{95A266B5-CF72-4147-9376-089A7804036A}"/>
+              </a:ext>
+            </a:extLst>
+          </p:cNvPr>
+          <p:cNvSpPr>
+            <a:spLocks noGrp="1"/>
+          </p:cNvSpPr>
+          <p:nvPr>
+            <p:ph idx="1"/>
+          </p:nvPr>
+        </p:nvSpPr>
+        <p:spPr/>
+        <p:txBody>
+          <a:bodyPr/>
+          <a:lstStyle/>
+          <a:p>
+            <a:r>
+              <a:rPr lang="de-DE" dirty="0"/>
+              <a:t>Verschachtelung ist nett, übertreibe es aber nicht </a:t>
+            </a:r>
+            <a:r>
+              <a:rPr lang="de-DE" dirty="0">
+                <a:sym typeface="Wingdings" pitchFamily="2" charset="2"/>
+              </a:rPr>
+              <a:t></a:t>
+            </a:r>
+          </a:p>
+          <a:p>
+            <a:r>
+              <a:rPr lang="de-DE" dirty="0">
+                <a:sym typeface="Wingdings" pitchFamily="2" charset="2"/>
+              </a:rPr>
+              <a:t>Mehr wie drei Ebenen solltest du vermeiden!</a:t>
+            </a:r>
+            <a:endParaRPr lang="de-DE" dirty="0"/>
+          </a:p>
+        </p:txBody>
+      </p:sp>
+    </p:spTree>
+    <p:extLst>
+      <p:ext uri="{BB962C8B-B14F-4D97-AF65-F5344CB8AC3E}">
+        <p14:creationId xmlns:p14="http://schemas.microsoft.com/office/powerpoint/2010/main" val="3466309852"/>
+      </p:ext>
+    </p:extLst>
+  </p:cSld>
+  <p:clrMapOvr>
+    <a:masterClrMapping/>
+  </p:clrMapOvr>
+</p:sld>
+</file>
+
+<file path=ppt/slides/slide11.xml><?xml version="1.0" encoding="utf-8"?>
+<p:sld xmlns:a="http://schemas.openxmlformats.org/drawingml/2006/main" xmlns:r="http://schemas.openxmlformats.org/officeDocument/2006/relationships" xmlns:p="http://schemas.openxmlformats.org/presentationml/2006/main">
+  <p:cSld>
+    <p:spTree>
+      <p:nvGrpSpPr>
+        <p:cNvPr id="1" name=""/>
+        <p:cNvGrpSpPr/>
+        <p:nvPr/>
+      </p:nvGrpSpPr>
+      <p:grpSpPr>
+        <a:xfrm>
+          <a:off x="0" y="0"/>
+          <a:ext cx="0" cy="0"/>
+          <a:chOff x="0" y="0"/>
+          <a:chExt cx="0" cy="0"/>
+        </a:xfrm>
+      </p:grpSpPr>
+      <p:sp>
+        <p:nvSpPr>
           <p:cNvPr id="2" name="Title 1">
             <a:extLst>
               <a:ext uri="{FF2B5EF4-FFF2-40B4-BE49-F238E27FC236}">
@@ -8447,7 +8552,7 @@
 </p:sld>
 </file>
 
-<file path=ppt/slides/slide11.xml><?xml version="1.0" encoding="utf-8"?>
+<file path=ppt/slides/slide12.xml><?xml version="1.0" encoding="utf-8"?>
 <p:sld xmlns:a="http://schemas.openxmlformats.org/drawingml/2006/main" xmlns:r="http://schemas.openxmlformats.org/officeDocument/2006/relationships" xmlns:p="http://schemas.openxmlformats.org/presentationml/2006/main">
   <p:cSld>
     <p:spTree>
@@ -8889,7 +8994,7 @@
 </p:sld>
 </file>
 
-<file path=ppt/slides/slide12.xml><?xml version="1.0" encoding="utf-8"?>
+<file path=ppt/slides/slide13.xml><?xml version="1.0" encoding="utf-8"?>
 <p:sld xmlns:a="http://schemas.openxmlformats.org/drawingml/2006/main" xmlns:r="http://schemas.openxmlformats.org/officeDocument/2006/relationships" xmlns:p="http://schemas.openxmlformats.org/presentationml/2006/main">
   <p:cSld>
     <p:spTree>
@@ -9313,149 +9418,6 @@
 </p:sld>
 </file>
 
-<file path=ppt/slides/slide13.xml><?xml version="1.0" encoding="utf-8"?>
-<p:sld xmlns:a="http://schemas.openxmlformats.org/drawingml/2006/main" xmlns:r="http://schemas.openxmlformats.org/officeDocument/2006/relationships" xmlns:p="http://schemas.openxmlformats.org/presentationml/2006/main">
-  <p:cSld>
-    <p:spTree>
-      <p:nvGrpSpPr>
-        <p:cNvPr id="1" name=""/>
-        <p:cNvGrpSpPr/>
-        <p:nvPr/>
-      </p:nvGrpSpPr>
-      <p:grpSpPr>
-        <a:xfrm>
-          <a:off x="0" y="0"/>
-          <a:ext cx="0" cy="0"/>
-          <a:chOff x="0" y="0"/>
-          <a:chExt cx="0" cy="0"/>
-        </a:xfrm>
-      </p:grpSpPr>
-      <p:sp>
-        <p:nvSpPr>
-          <p:cNvPr id="2" name="Title 1">
-            <a:extLst>
-              <a:ext uri="{FF2B5EF4-FFF2-40B4-BE49-F238E27FC236}">
-                <a16:creationId xmlns:a16="http://schemas.microsoft.com/office/drawing/2014/main" id="{DD9F8BDB-A81A-F54A-A602-A5F1CA688060}"/>
-              </a:ext>
-            </a:extLst>
-          </p:cNvPr>
-          <p:cNvSpPr>
-            <a:spLocks noGrp="1"/>
-          </p:cNvSpPr>
-          <p:nvPr>
-            <p:ph type="title"/>
-          </p:nvPr>
-        </p:nvSpPr>
-        <p:spPr/>
-        <p:txBody>
-          <a:bodyPr/>
-          <a:lstStyle/>
-          <a:p>
-            <a:r>
-              <a:rPr lang="en-US" b="1" dirty="0"/>
-              <a:t>Partials </a:t>
-            </a:r>
-            <a:endParaRPr lang="en-US" dirty="0"/>
-          </a:p>
-        </p:txBody>
-      </p:sp>
-      <p:sp>
-        <p:nvSpPr>
-          <p:cNvPr id="3" name="Content Placeholder 2">
-            <a:extLst>
-              <a:ext uri="{FF2B5EF4-FFF2-40B4-BE49-F238E27FC236}">
-                <a16:creationId xmlns:a16="http://schemas.microsoft.com/office/drawing/2014/main" id="{978704AA-BC68-5C42-A69A-61455BC9D871}"/>
-              </a:ext>
-            </a:extLst>
-          </p:cNvPr>
-          <p:cNvSpPr>
-            <a:spLocks noGrp="1"/>
-          </p:cNvSpPr>
-          <p:nvPr>
-            <p:ph idx="1"/>
-          </p:nvPr>
-        </p:nvSpPr>
-        <p:spPr/>
-        <p:txBody>
-          <a:bodyPr/>
-          <a:lstStyle/>
-          <a:p>
-            <a:r>
-              <a:rPr lang="de" dirty="0"/>
-              <a:t>Mit </a:t>
-            </a:r>
-            <a:r>
-              <a:rPr lang="de" dirty="0" err="1"/>
-              <a:t>Scss</a:t>
-            </a:r>
-            <a:r>
-              <a:rPr lang="de" dirty="0"/>
-              <a:t> kannst du Styles in kleinere Dateien aufteilen, die dann z.B. jeweils die Styles für eine einzelne Komponente enthalten.</a:t>
-            </a:r>
-          </a:p>
-          <a:p>
-            <a:r>
-              <a:rPr lang="de" dirty="0"/>
-              <a:t>Die Dateinamen der </a:t>
-            </a:r>
-            <a:r>
-              <a:rPr lang="de" dirty="0" err="1"/>
-              <a:t>Partials</a:t>
-            </a:r>
-            <a:r>
-              <a:rPr lang="de" dirty="0"/>
-              <a:t> beginnen jeweils mit _</a:t>
-            </a:r>
-          </a:p>
-          <a:p>
-            <a:r>
-              <a:rPr lang="en-US" dirty="0" err="1"/>
-              <a:t>z.B</a:t>
-            </a:r>
-            <a:r>
-              <a:rPr lang="en-US" dirty="0"/>
-              <a:t>.: _</a:t>
-            </a:r>
-            <a:r>
-              <a:rPr lang="en-US" dirty="0" err="1"/>
-              <a:t>colors.scss</a:t>
-            </a:r>
-            <a:r>
-              <a:rPr lang="en-US" dirty="0"/>
-              <a:t> </a:t>
-            </a:r>
-            <a:r>
-              <a:rPr lang="en-US" dirty="0" err="1"/>
-              <a:t>oder</a:t>
-            </a:r>
-            <a:r>
-              <a:rPr lang="en-US" dirty="0"/>
-              <a:t> _</a:t>
-            </a:r>
-            <a:r>
-              <a:rPr lang="en-US" dirty="0" err="1"/>
-              <a:t>navigation.scss</a:t>
-            </a:r>
-            <a:endParaRPr lang="de" dirty="0"/>
-          </a:p>
-          <a:p>
-            <a:endParaRPr lang="en-US" dirty="0"/>
-          </a:p>
-        </p:txBody>
-      </p:sp>
-    </p:spTree>
-    <p:extLst>
-      <p:ext uri="{BB962C8B-B14F-4D97-AF65-F5344CB8AC3E}">
-        <p14:creationId xmlns:p14="http://schemas.microsoft.com/office/powerpoint/2010/main" val="2507586907"/>
-      </p:ext>
-    </p:extLst>
-  </p:cSld>
-  <p:clrMapOvr>
-    <a:masterClrMapping/>
-  </p:clrMapOvr>
-</p:sld>
-</file>
-
 <file path=ppt/slides/slide14.xml><?xml version="1.0" encoding="utf-8"?>
 <p:sld xmlns:a="http://schemas.openxmlformats.org/drawingml/2006/main" xmlns:r="http://schemas.openxmlformats.org/officeDocument/2006/relationships" xmlns:p="http://schemas.openxmlformats.org/presentationml/2006/main">
   <p:cSld>
@@ -9478,7 +9440,7 @@
           <p:cNvPr id="2" name="Title 1">
             <a:extLst>
               <a:ext uri="{FF2B5EF4-FFF2-40B4-BE49-F238E27FC236}">
-                <a16:creationId xmlns:a16="http://schemas.microsoft.com/office/drawing/2014/main" id="{EC653A15-68DF-0645-B047-CD0EB0E4D5C4}"/>
+                <a16:creationId xmlns:a16="http://schemas.microsoft.com/office/drawing/2014/main" id="{DD9F8BDB-A81A-F54A-A602-A5F1CA688060}"/>
               </a:ext>
             </a:extLst>
           </p:cNvPr>
@@ -9495,9 +9457,10 @@
           <a:lstStyle/>
           <a:p>
             <a:r>
-              <a:rPr lang="en-US" dirty="0"/>
-              <a:t>Imports</a:t>
-            </a:r>
+              <a:rPr lang="en-US" b="1" dirty="0"/>
+              <a:t>Partials </a:t>
+            </a:r>
+            <a:endParaRPr lang="en-US" dirty="0"/>
           </a:p>
         </p:txBody>
       </p:sp>
@@ -9506,7 +9469,7 @@
           <p:cNvPr id="3" name="Content Placeholder 2">
             <a:extLst>
               <a:ext uri="{FF2B5EF4-FFF2-40B4-BE49-F238E27FC236}">
-                <a16:creationId xmlns:a16="http://schemas.microsoft.com/office/drawing/2014/main" id="{3A0A6CB5-8CC3-8B44-9AA5-75017FEEDABD}"/>
+                <a16:creationId xmlns:a16="http://schemas.microsoft.com/office/drawing/2014/main" id="{978704AA-BC68-5C42-A69A-61455BC9D871}"/>
               </a:ext>
             </a:extLst>
           </p:cNvPr>
@@ -9523,73 +9486,61 @@
           <a:lstStyle/>
           <a:p>
             <a:r>
+              <a:rPr lang="de" dirty="0"/>
+              <a:t>Mit </a:t>
+            </a:r>
+            <a:r>
+              <a:rPr lang="de" dirty="0" err="1"/>
+              <a:t>Scss</a:t>
+            </a:r>
+            <a:r>
+              <a:rPr lang="de" dirty="0"/>
+              <a:t> kannst du Styles in kleinere Dateien aufteilen, die dann z.B. jeweils die Styles für eine einzelne Komponente enthalten.</a:t>
+            </a:r>
+          </a:p>
+          <a:p>
+            <a:r>
+              <a:rPr lang="de" dirty="0"/>
+              <a:t>Die Dateinamen der </a:t>
+            </a:r>
+            <a:r>
               <a:rPr lang="de" dirty="0" err="1"/>
               <a:t>Partials</a:t>
             </a:r>
             <a:r>
               <a:rPr lang="de" dirty="0"/>
-              <a:t> bindest du mittels </a:t>
-            </a:r>
-            <a:r>
-              <a:rPr lang="de" b="1" dirty="0"/>
-              <a:t>@</a:t>
-            </a:r>
-            <a:r>
-              <a:rPr lang="de" b="1" dirty="0" err="1"/>
-              <a:t>import</a:t>
-            </a:r>
-            <a:r>
-              <a:rPr lang="de" b="1" dirty="0"/>
+              <a:t> beginnen jeweils mit _</a:t>
+            </a:r>
+          </a:p>
+          <a:p>
+            <a:r>
+              <a:rPr lang="en-US" dirty="0" err="1"/>
+              <a:t>z.B</a:t>
+            </a:r>
+            <a:r>
+              <a:rPr lang="en-US" dirty="0"/>
+              <a:t>.: _</a:t>
+            </a:r>
+            <a:r>
+              <a:rPr lang="en-US" dirty="0" err="1"/>
+              <a:t>colors.scss</a:t>
+            </a:r>
+            <a:r>
+              <a:rPr lang="en-US" dirty="0"/>
               <a:t> </a:t>
             </a:r>
             <a:r>
-              <a:rPr lang="de" dirty="0"/>
-              <a:t>in deine Hauptdatei ein. Der Inhalt der zu importierenden Dateien wird dann durch den Präprozessor in dein kompiliertes CSS geladen.</a:t>
-            </a:r>
-          </a:p>
-          <a:p>
+              <a:rPr lang="en-US" dirty="0" err="1"/>
+              <a:t>oder</a:t>
+            </a:r>
             <a:r>
               <a:rPr lang="en-US" dirty="0"/>
-              <a:t>z</a:t>
-            </a:r>
-            <a:r>
-              <a:rPr lang="de" dirty="0"/>
-              <a:t>.B.: </a:t>
-            </a:r>
-            <a:r>
-              <a:rPr lang="en-US" b="1" dirty="0"/>
-              <a:t>@import “components/colors”;</a:t>
-            </a:r>
-          </a:p>
-          <a:p>
-            <a:r>
-              <a:rPr lang="de" dirty="0"/>
-              <a:t>Beachte, dass du beim Schreiben des Import-Statements den Unterstrich _ welchen du im Namen des </a:t>
-            </a:r>
-            <a:r>
-              <a:rPr lang="de" dirty="0" err="1"/>
-              <a:t>Partials</a:t>
-            </a:r>
-            <a:r>
-              <a:rPr lang="de" dirty="0"/>
-              <a:t> angegeben hast, sowie die Endung “.</a:t>
-            </a:r>
-            <a:r>
-              <a:rPr lang="de" dirty="0" err="1"/>
-              <a:t>scss</a:t>
-            </a:r>
-            <a:r>
-              <a:rPr lang="de" dirty="0"/>
-              <a:t>” weglassen musst. </a:t>
-            </a:r>
-          </a:p>
-          <a:p>
-            <a:endParaRPr lang="en-US" dirty="0"/>
-          </a:p>
-          <a:p>
-            <a:pPr marL="0" indent="0">
-              <a:buNone/>
-            </a:pPr>
+              <a:t> _</a:t>
+            </a:r>
+            <a:r>
+              <a:rPr lang="en-US" dirty="0" err="1"/>
+              <a:t>navigation.scss</a:t>
+            </a:r>
             <a:endParaRPr lang="de" dirty="0"/>
           </a:p>
           <a:p>
@@ -9600,7 +9551,7 @@
     </p:spTree>
     <p:extLst>
       <p:ext uri="{BB962C8B-B14F-4D97-AF65-F5344CB8AC3E}">
-        <p14:creationId xmlns:p14="http://schemas.microsoft.com/office/powerpoint/2010/main" val="1518488026"/>
+        <p14:creationId xmlns:p14="http://schemas.microsoft.com/office/powerpoint/2010/main" val="2507586907"/>
       </p:ext>
     </p:extLst>
   </p:cSld>
@@ -9632,6 +9583,160 @@
           <p:cNvPr id="2" name="Title 1">
             <a:extLst>
               <a:ext uri="{FF2B5EF4-FFF2-40B4-BE49-F238E27FC236}">
+                <a16:creationId xmlns:a16="http://schemas.microsoft.com/office/drawing/2014/main" id="{EC653A15-68DF-0645-B047-CD0EB0E4D5C4}"/>
+              </a:ext>
+            </a:extLst>
+          </p:cNvPr>
+          <p:cNvSpPr>
+            <a:spLocks noGrp="1"/>
+          </p:cNvSpPr>
+          <p:nvPr>
+            <p:ph type="title"/>
+          </p:nvPr>
+        </p:nvSpPr>
+        <p:spPr/>
+        <p:txBody>
+          <a:bodyPr/>
+          <a:lstStyle/>
+          <a:p>
+            <a:r>
+              <a:rPr lang="en-US" dirty="0"/>
+              <a:t>Imports</a:t>
+            </a:r>
+          </a:p>
+        </p:txBody>
+      </p:sp>
+      <p:sp>
+        <p:nvSpPr>
+          <p:cNvPr id="3" name="Content Placeholder 2">
+            <a:extLst>
+              <a:ext uri="{FF2B5EF4-FFF2-40B4-BE49-F238E27FC236}">
+                <a16:creationId xmlns:a16="http://schemas.microsoft.com/office/drawing/2014/main" id="{3A0A6CB5-8CC3-8B44-9AA5-75017FEEDABD}"/>
+              </a:ext>
+            </a:extLst>
+          </p:cNvPr>
+          <p:cNvSpPr>
+            <a:spLocks noGrp="1"/>
+          </p:cNvSpPr>
+          <p:nvPr>
+            <p:ph idx="1"/>
+          </p:nvPr>
+        </p:nvSpPr>
+        <p:spPr/>
+        <p:txBody>
+          <a:bodyPr/>
+          <a:lstStyle/>
+          <a:p>
+            <a:r>
+              <a:rPr lang="de" dirty="0" err="1"/>
+              <a:t>Partials</a:t>
+            </a:r>
+            <a:r>
+              <a:rPr lang="de" dirty="0"/>
+              <a:t> bindest du mittels </a:t>
+            </a:r>
+            <a:r>
+              <a:rPr lang="de" b="1" dirty="0"/>
+              <a:t>@</a:t>
+            </a:r>
+            <a:r>
+              <a:rPr lang="de" b="1" dirty="0" err="1"/>
+              <a:t>import</a:t>
+            </a:r>
+            <a:r>
+              <a:rPr lang="de" b="1" dirty="0"/>
+              <a:t> </a:t>
+            </a:r>
+            <a:r>
+              <a:rPr lang="de" dirty="0"/>
+              <a:t>in deine Hauptdatei ein. Der Inhalt der zu importierenden Dateien wird dann durch den Präprozessor in dein kompiliertes CSS geladen.</a:t>
+            </a:r>
+          </a:p>
+          <a:p>
+            <a:r>
+              <a:rPr lang="en-US" dirty="0"/>
+              <a:t>z</a:t>
+            </a:r>
+            <a:r>
+              <a:rPr lang="de" dirty="0"/>
+              <a:t>.B.: </a:t>
+            </a:r>
+            <a:r>
+              <a:rPr lang="en-US" b="1" dirty="0"/>
+              <a:t>@import “components/colors”;</a:t>
+            </a:r>
+          </a:p>
+          <a:p>
+            <a:r>
+              <a:rPr lang="de" dirty="0"/>
+              <a:t>Beachte, dass du beim Schreiben des Import-Statements den Unterstrich _ welchen du im Namen des </a:t>
+            </a:r>
+            <a:r>
+              <a:rPr lang="de" dirty="0" err="1"/>
+              <a:t>Partials</a:t>
+            </a:r>
+            <a:r>
+              <a:rPr lang="de" dirty="0"/>
+              <a:t> angegeben hast, sowie die Endung “.</a:t>
+            </a:r>
+            <a:r>
+              <a:rPr lang="de" dirty="0" err="1"/>
+              <a:t>scss</a:t>
+            </a:r>
+            <a:r>
+              <a:rPr lang="de" dirty="0"/>
+              <a:t>” weglassen musst. </a:t>
+            </a:r>
+          </a:p>
+          <a:p>
+            <a:endParaRPr lang="en-US" dirty="0"/>
+          </a:p>
+          <a:p>
+            <a:pPr marL="0" indent="0">
+              <a:buNone/>
+            </a:pPr>
+            <a:endParaRPr lang="de" dirty="0"/>
+          </a:p>
+          <a:p>
+            <a:endParaRPr lang="en-US" dirty="0"/>
+          </a:p>
+        </p:txBody>
+      </p:sp>
+    </p:spTree>
+    <p:extLst>
+      <p:ext uri="{BB962C8B-B14F-4D97-AF65-F5344CB8AC3E}">
+        <p14:creationId xmlns:p14="http://schemas.microsoft.com/office/powerpoint/2010/main" val="1518488026"/>
+      </p:ext>
+    </p:extLst>
+  </p:cSld>
+  <p:clrMapOvr>
+    <a:masterClrMapping/>
+  </p:clrMapOvr>
+</p:sld>
+</file>
+
+<file path=ppt/slides/slide16.xml><?xml version="1.0" encoding="utf-8"?>
+<p:sld xmlns:a="http://schemas.openxmlformats.org/drawingml/2006/main" xmlns:r="http://schemas.openxmlformats.org/officeDocument/2006/relationships" xmlns:p="http://schemas.openxmlformats.org/presentationml/2006/main">
+  <p:cSld>
+    <p:spTree>
+      <p:nvGrpSpPr>
+        <p:cNvPr id="1" name=""/>
+        <p:cNvGrpSpPr/>
+        <p:nvPr/>
+      </p:nvGrpSpPr>
+      <p:grpSpPr>
+        <a:xfrm>
+          <a:off x="0" y="0"/>
+          <a:ext cx="0" cy="0"/>
+          <a:chOff x="0" y="0"/>
+          <a:chExt cx="0" cy="0"/>
+        </a:xfrm>
+      </p:grpSpPr>
+      <p:sp>
+        <p:nvSpPr>
+          <p:cNvPr id="2" name="Title 1">
+            <a:extLst>
+              <a:ext uri="{FF2B5EF4-FFF2-40B4-BE49-F238E27FC236}">
                 <a16:creationId xmlns:a16="http://schemas.microsoft.com/office/drawing/2014/main" id="{26C6A76D-5CF4-C64F-B43C-FDA8272E1C8F}"/>
               </a:ext>
             </a:extLst>
@@ -9744,7 +9849,7 @@
 </p:sld>
 </file>
 
-<file path=ppt/slides/slide16.xml><?xml version="1.0" encoding="utf-8"?>
+<file path=ppt/slides/slide17.xml><?xml version="1.0" encoding="utf-8"?>
 <p:sld xmlns:a="http://schemas.openxmlformats.org/drawingml/2006/main" xmlns:r="http://schemas.openxmlformats.org/officeDocument/2006/relationships" xmlns:p="http://schemas.openxmlformats.org/presentationml/2006/main">
   <p:cSld>
     <p:spTree>
@@ -10337,307 +10442,6 @@
 </p:sld>
 </file>
 
-<file path=ppt/slides/slide17.xml><?xml version="1.0" encoding="utf-8"?>
-<p:sld xmlns:a="http://schemas.openxmlformats.org/drawingml/2006/main" xmlns:r="http://schemas.openxmlformats.org/officeDocument/2006/relationships" xmlns:p="http://schemas.openxmlformats.org/presentationml/2006/main">
-  <p:cSld>
-    <p:spTree>
-      <p:nvGrpSpPr>
-        <p:cNvPr id="1" name=""/>
-        <p:cNvGrpSpPr/>
-        <p:nvPr/>
-      </p:nvGrpSpPr>
-      <p:grpSpPr>
-        <a:xfrm>
-          <a:off x="0" y="0"/>
-          <a:ext cx="0" cy="0"/>
-          <a:chOff x="0" y="0"/>
-          <a:chExt cx="0" cy="0"/>
-        </a:xfrm>
-      </p:grpSpPr>
-      <p:sp>
-        <p:nvSpPr>
-          <p:cNvPr id="2" name="Title 1">
-            <a:extLst>
-              <a:ext uri="{FF2B5EF4-FFF2-40B4-BE49-F238E27FC236}">
-                <a16:creationId xmlns:a16="http://schemas.microsoft.com/office/drawing/2014/main" id="{CB2C7022-859A-3D4A-B8AD-10EBAA9E5EAA}"/>
-              </a:ext>
-            </a:extLst>
-          </p:cNvPr>
-          <p:cNvSpPr>
-            <a:spLocks noGrp="1"/>
-          </p:cNvSpPr>
-          <p:nvPr>
-            <p:ph type="title"/>
-          </p:nvPr>
-        </p:nvSpPr>
-        <p:spPr/>
-        <p:txBody>
-          <a:bodyPr/>
-          <a:lstStyle/>
-          <a:p>
-            <a:r>
-              <a:rPr lang="en-US" dirty="0" err="1"/>
-              <a:t>Übung</a:t>
-            </a:r>
-            <a:endParaRPr lang="en-US" dirty="0"/>
-          </a:p>
-        </p:txBody>
-      </p:sp>
-      <p:sp>
-        <p:nvSpPr>
-          <p:cNvPr id="3" name="Content Placeholder 2">
-            <a:extLst>
-              <a:ext uri="{FF2B5EF4-FFF2-40B4-BE49-F238E27FC236}">
-                <a16:creationId xmlns:a16="http://schemas.microsoft.com/office/drawing/2014/main" id="{2D41A5A2-0BD6-E84D-BC79-8381456AC3EE}"/>
-              </a:ext>
-            </a:extLst>
-          </p:cNvPr>
-          <p:cNvSpPr>
-            <a:spLocks noGrp="1"/>
-          </p:cNvSpPr>
-          <p:nvPr>
-            <p:ph idx="1"/>
-          </p:nvPr>
-        </p:nvSpPr>
-        <p:spPr/>
-        <p:txBody>
-          <a:bodyPr>
-            <a:normAutofit/>
-          </a:bodyPr>
-          <a:lstStyle/>
-          <a:p>
-            <a:r>
-              <a:rPr lang="en-US" dirty="0" err="1"/>
-              <a:t>Installiere</a:t>
-            </a:r>
-            <a:r>
-              <a:rPr lang="en-US" dirty="0"/>
-              <a:t> den </a:t>
-            </a:r>
-            <a:r>
-              <a:rPr lang="en-US" dirty="0" err="1"/>
-              <a:t>scss</a:t>
-            </a:r>
-            <a:r>
-              <a:rPr lang="en-US" dirty="0"/>
-              <a:t> </a:t>
-            </a:r>
-            <a:r>
-              <a:rPr lang="en-US" dirty="0" err="1"/>
-              <a:t>Präprozessor</a:t>
-            </a:r>
-            <a:br>
-              <a:rPr lang="en-US" dirty="0"/>
-            </a:br>
-            <a:r>
-              <a:rPr lang="en-US" dirty="0" err="1">
-                <a:solidFill>
-                  <a:schemeClr val="bg1"/>
-                </a:solidFill>
-              </a:rPr>
-              <a:t>npm</a:t>
-            </a:r>
-            <a:r>
-              <a:rPr lang="en-US" dirty="0">
-                <a:solidFill>
-                  <a:schemeClr val="bg1"/>
-                </a:solidFill>
-              </a:rPr>
-              <a:t> install -g node-sass </a:t>
-            </a:r>
-          </a:p>
-          <a:p>
-            <a:r>
-              <a:rPr lang="en-US" dirty="0" err="1"/>
-              <a:t>Wandle</a:t>
-            </a:r>
-            <a:r>
-              <a:rPr lang="en-US" dirty="0"/>
-              <a:t> </a:t>
-            </a:r>
-            <a:r>
-              <a:rPr lang="en-US" dirty="0" err="1"/>
-              <a:t>ein</a:t>
-            </a:r>
-            <a:r>
-              <a:rPr lang="en-US" dirty="0"/>
-              <a:t> </a:t>
-            </a:r>
-            <a:r>
-              <a:rPr lang="en-US" dirty="0" err="1"/>
-              <a:t>scss</a:t>
-            </a:r>
-            <a:r>
-              <a:rPr lang="en-US" dirty="0"/>
-              <a:t> File in </a:t>
-            </a:r>
-            <a:r>
-              <a:rPr lang="en-US" dirty="0" err="1"/>
-              <a:t>ein</a:t>
-            </a:r>
-            <a:r>
-              <a:rPr lang="en-US" dirty="0"/>
-              <a:t> </a:t>
-            </a:r>
-            <a:r>
-              <a:rPr lang="en-US" dirty="0" err="1"/>
-              <a:t>css</a:t>
-            </a:r>
-            <a:r>
-              <a:rPr lang="en-US" dirty="0"/>
-              <a:t> File um</a:t>
-            </a:r>
-            <a:br>
-              <a:rPr lang="en-US" dirty="0"/>
-            </a:br>
-            <a:r>
-              <a:rPr lang="en-US" dirty="0">
-                <a:solidFill>
-                  <a:schemeClr val="bg1"/>
-                </a:solidFill>
-              </a:rPr>
-              <a:t>node-sass </a:t>
-            </a:r>
-            <a:r>
-              <a:rPr lang="en-US" dirty="0" err="1">
-                <a:solidFill>
-                  <a:schemeClr val="bg1"/>
-                </a:solidFill>
-              </a:rPr>
-              <a:t>test.scss</a:t>
-            </a:r>
-            <a:r>
-              <a:rPr lang="en-US" dirty="0">
-                <a:solidFill>
-                  <a:schemeClr val="bg1"/>
-                </a:solidFill>
-              </a:rPr>
-              <a:t> </a:t>
-            </a:r>
-            <a:r>
-              <a:rPr lang="en-US" dirty="0" err="1">
-                <a:solidFill>
-                  <a:schemeClr val="bg1"/>
-                </a:solidFill>
-              </a:rPr>
-              <a:t>test.css</a:t>
-            </a:r>
-            <a:endParaRPr lang="en-US" dirty="0">
-              <a:solidFill>
-                <a:schemeClr val="bg1"/>
-              </a:solidFill>
-            </a:endParaRPr>
-          </a:p>
-          <a:p>
-            <a:r>
-              <a:rPr lang="de" dirty="0"/>
-              <a:t>Es gibt einen “</a:t>
-            </a:r>
-            <a:r>
-              <a:rPr lang="de" dirty="0" err="1"/>
-              <a:t>watcher</a:t>
-            </a:r>
-            <a:r>
-              <a:rPr lang="de" dirty="0"/>
-              <a:t>”, der die Änderungen in der </a:t>
-            </a:r>
-            <a:r>
-              <a:rPr lang="de" dirty="0" err="1"/>
-              <a:t>scss</a:t>
-            </a:r>
-            <a:r>
-              <a:rPr lang="de" dirty="0"/>
-              <a:t>-Datei feststellt und jeweils den Präprozessor in Gang setzt. </a:t>
-            </a:r>
-            <a:br>
-              <a:rPr lang="de" dirty="0"/>
-            </a:br>
-            <a:r>
-              <a:rPr lang="de" dirty="0"/>
-              <a:t>Probiere folgendes Kommando aus:</a:t>
-            </a:r>
-            <a:br>
-              <a:rPr lang="de" dirty="0"/>
-            </a:br>
-            <a:r>
-              <a:rPr lang="en-US" dirty="0">
-                <a:solidFill>
-                  <a:schemeClr val="bg1"/>
-                </a:solidFill>
-              </a:rPr>
-              <a:t>node-sass --watch </a:t>
-            </a:r>
-            <a:r>
-              <a:rPr lang="en-US" dirty="0" err="1">
-                <a:solidFill>
-                  <a:schemeClr val="bg1"/>
-                </a:solidFill>
-              </a:rPr>
-              <a:t>test.scss</a:t>
-            </a:r>
-            <a:r>
-              <a:rPr lang="en-US" dirty="0">
-                <a:solidFill>
-                  <a:schemeClr val="bg1"/>
-                </a:solidFill>
-              </a:rPr>
-              <a:t> </a:t>
-            </a:r>
-            <a:r>
-              <a:rPr lang="en-US" dirty="0" err="1">
-                <a:solidFill>
-                  <a:schemeClr val="bg1"/>
-                </a:solidFill>
-              </a:rPr>
-              <a:t>test.css</a:t>
-            </a:r>
-            <a:r>
-              <a:rPr lang="en-US" dirty="0">
-                <a:solidFill>
-                  <a:schemeClr val="bg1"/>
-                </a:solidFill>
-              </a:rPr>
-              <a:t> </a:t>
-            </a:r>
-            <a:br>
-              <a:rPr lang="de" dirty="0"/>
-            </a:br>
-            <a:endParaRPr lang="de" dirty="0"/>
-          </a:p>
-          <a:p>
-            <a:endParaRPr lang="en-US" dirty="0">
-              <a:solidFill>
-                <a:schemeClr val="bg1"/>
-              </a:solidFill>
-            </a:endParaRPr>
-          </a:p>
-          <a:p>
-            <a:endParaRPr lang="en-US" dirty="0"/>
-          </a:p>
-          <a:p>
-            <a:endParaRPr lang="en-US" dirty="0"/>
-          </a:p>
-          <a:p>
-            <a:pPr marL="0" indent="0">
-              <a:buNone/>
-            </a:pPr>
-            <a:endParaRPr lang="en-US" dirty="0"/>
-          </a:p>
-        </p:txBody>
-      </p:sp>
-    </p:spTree>
-    <p:extLst>
-      <p:ext uri="{BB962C8B-B14F-4D97-AF65-F5344CB8AC3E}">
-        <p14:creationId xmlns:p14="http://schemas.microsoft.com/office/powerpoint/2010/main" val="714050327"/>
-      </p:ext>
-    </p:extLst>
-  </p:cSld>
-  <p:clrMapOvr>
-    <a:masterClrMapping/>
-  </p:clrMapOvr>
-</p:sld>
-</file>
-
 <file path=ppt/slides/slide18.xml><?xml version="1.0" encoding="utf-8"?>
 <p:sld xmlns:a="http://schemas.openxmlformats.org/drawingml/2006/main" xmlns:r="http://schemas.openxmlformats.org/officeDocument/2006/relationships" xmlns:p="http://schemas.openxmlformats.org/presentationml/2006/main">
   <p:cSld>
@@ -10660,6 +10464,307 @@
           <p:cNvPr id="2" name="Title 1">
             <a:extLst>
               <a:ext uri="{FF2B5EF4-FFF2-40B4-BE49-F238E27FC236}">
+                <a16:creationId xmlns:a16="http://schemas.microsoft.com/office/drawing/2014/main" id="{CB2C7022-859A-3D4A-B8AD-10EBAA9E5EAA}"/>
+              </a:ext>
+            </a:extLst>
+          </p:cNvPr>
+          <p:cNvSpPr>
+            <a:spLocks noGrp="1"/>
+          </p:cNvSpPr>
+          <p:nvPr>
+            <p:ph type="title"/>
+          </p:nvPr>
+        </p:nvSpPr>
+        <p:spPr/>
+        <p:txBody>
+          <a:bodyPr/>
+          <a:lstStyle/>
+          <a:p>
+            <a:r>
+              <a:rPr lang="en-US" dirty="0" err="1"/>
+              <a:t>Übung</a:t>
+            </a:r>
+            <a:endParaRPr lang="en-US" dirty="0"/>
+          </a:p>
+        </p:txBody>
+      </p:sp>
+      <p:sp>
+        <p:nvSpPr>
+          <p:cNvPr id="3" name="Content Placeholder 2">
+            <a:extLst>
+              <a:ext uri="{FF2B5EF4-FFF2-40B4-BE49-F238E27FC236}">
+                <a16:creationId xmlns:a16="http://schemas.microsoft.com/office/drawing/2014/main" id="{2D41A5A2-0BD6-E84D-BC79-8381456AC3EE}"/>
+              </a:ext>
+            </a:extLst>
+          </p:cNvPr>
+          <p:cNvSpPr>
+            <a:spLocks noGrp="1"/>
+          </p:cNvSpPr>
+          <p:nvPr>
+            <p:ph idx="1"/>
+          </p:nvPr>
+        </p:nvSpPr>
+        <p:spPr/>
+        <p:txBody>
+          <a:bodyPr>
+            <a:normAutofit/>
+          </a:bodyPr>
+          <a:lstStyle/>
+          <a:p>
+            <a:r>
+              <a:rPr lang="en-US" dirty="0" err="1"/>
+              <a:t>Installiere</a:t>
+            </a:r>
+            <a:r>
+              <a:rPr lang="en-US" dirty="0"/>
+              <a:t> den </a:t>
+            </a:r>
+            <a:r>
+              <a:rPr lang="en-US" dirty="0" err="1"/>
+              <a:t>scss</a:t>
+            </a:r>
+            <a:r>
+              <a:rPr lang="en-US" dirty="0"/>
+              <a:t> </a:t>
+            </a:r>
+            <a:r>
+              <a:rPr lang="en-US" dirty="0" err="1"/>
+              <a:t>Präprozessor</a:t>
+            </a:r>
+            <a:br>
+              <a:rPr lang="en-US" dirty="0"/>
+            </a:br>
+            <a:r>
+              <a:rPr lang="en-US" dirty="0" err="1">
+                <a:solidFill>
+                  <a:schemeClr val="bg1"/>
+                </a:solidFill>
+              </a:rPr>
+              <a:t>npm</a:t>
+            </a:r>
+            <a:r>
+              <a:rPr lang="en-US" dirty="0">
+                <a:solidFill>
+                  <a:schemeClr val="bg1"/>
+                </a:solidFill>
+              </a:rPr>
+              <a:t> install -g node-sass </a:t>
+            </a:r>
+          </a:p>
+          <a:p>
+            <a:r>
+              <a:rPr lang="en-US" dirty="0" err="1"/>
+              <a:t>Wandle</a:t>
+            </a:r>
+            <a:r>
+              <a:rPr lang="en-US" dirty="0"/>
+              <a:t> </a:t>
+            </a:r>
+            <a:r>
+              <a:rPr lang="en-US" dirty="0" err="1"/>
+              <a:t>ein</a:t>
+            </a:r>
+            <a:r>
+              <a:rPr lang="en-US" dirty="0"/>
+              <a:t> </a:t>
+            </a:r>
+            <a:r>
+              <a:rPr lang="en-US" dirty="0" err="1"/>
+              <a:t>scss</a:t>
+            </a:r>
+            <a:r>
+              <a:rPr lang="en-US" dirty="0"/>
+              <a:t> File in </a:t>
+            </a:r>
+            <a:r>
+              <a:rPr lang="en-US" dirty="0" err="1"/>
+              <a:t>ein</a:t>
+            </a:r>
+            <a:r>
+              <a:rPr lang="en-US" dirty="0"/>
+              <a:t> </a:t>
+            </a:r>
+            <a:r>
+              <a:rPr lang="en-US" dirty="0" err="1"/>
+              <a:t>css</a:t>
+            </a:r>
+            <a:r>
+              <a:rPr lang="en-US" dirty="0"/>
+              <a:t> File um</a:t>
+            </a:r>
+            <a:br>
+              <a:rPr lang="en-US" dirty="0"/>
+            </a:br>
+            <a:r>
+              <a:rPr lang="en-US" dirty="0">
+                <a:solidFill>
+                  <a:schemeClr val="bg1"/>
+                </a:solidFill>
+              </a:rPr>
+              <a:t>node-sass </a:t>
+            </a:r>
+            <a:r>
+              <a:rPr lang="en-US" dirty="0" err="1">
+                <a:solidFill>
+                  <a:schemeClr val="bg1"/>
+                </a:solidFill>
+              </a:rPr>
+              <a:t>test.scss</a:t>
+            </a:r>
+            <a:r>
+              <a:rPr lang="en-US" dirty="0">
+                <a:solidFill>
+                  <a:schemeClr val="bg1"/>
+                </a:solidFill>
+              </a:rPr>
+              <a:t> </a:t>
+            </a:r>
+            <a:r>
+              <a:rPr lang="en-US" dirty="0" err="1">
+                <a:solidFill>
+                  <a:schemeClr val="bg1"/>
+                </a:solidFill>
+              </a:rPr>
+              <a:t>test.css</a:t>
+            </a:r>
+            <a:endParaRPr lang="en-US" dirty="0">
+              <a:solidFill>
+                <a:schemeClr val="bg1"/>
+              </a:solidFill>
+            </a:endParaRPr>
+          </a:p>
+          <a:p>
+            <a:r>
+              <a:rPr lang="de" dirty="0"/>
+              <a:t>Es gibt einen “</a:t>
+            </a:r>
+            <a:r>
+              <a:rPr lang="de" dirty="0" err="1"/>
+              <a:t>watcher</a:t>
+            </a:r>
+            <a:r>
+              <a:rPr lang="de" dirty="0"/>
+              <a:t>”, der die Änderungen in der </a:t>
+            </a:r>
+            <a:r>
+              <a:rPr lang="de" dirty="0" err="1"/>
+              <a:t>scss</a:t>
+            </a:r>
+            <a:r>
+              <a:rPr lang="de" dirty="0"/>
+              <a:t>-Datei feststellt und jeweils den Präprozessor in Gang setzt. </a:t>
+            </a:r>
+            <a:br>
+              <a:rPr lang="de" dirty="0"/>
+            </a:br>
+            <a:r>
+              <a:rPr lang="de" dirty="0"/>
+              <a:t>Probiere folgendes Kommando aus:</a:t>
+            </a:r>
+            <a:br>
+              <a:rPr lang="de" dirty="0"/>
+            </a:br>
+            <a:r>
+              <a:rPr lang="en-US" dirty="0">
+                <a:solidFill>
+                  <a:schemeClr val="bg1"/>
+                </a:solidFill>
+              </a:rPr>
+              <a:t>node-sass --watch </a:t>
+            </a:r>
+            <a:r>
+              <a:rPr lang="en-US" dirty="0" err="1">
+                <a:solidFill>
+                  <a:schemeClr val="bg1"/>
+                </a:solidFill>
+              </a:rPr>
+              <a:t>test.scss</a:t>
+            </a:r>
+            <a:r>
+              <a:rPr lang="en-US" dirty="0">
+                <a:solidFill>
+                  <a:schemeClr val="bg1"/>
+                </a:solidFill>
+              </a:rPr>
+              <a:t> </a:t>
+            </a:r>
+            <a:r>
+              <a:rPr lang="en-US" dirty="0" err="1">
+                <a:solidFill>
+                  <a:schemeClr val="bg1"/>
+                </a:solidFill>
+              </a:rPr>
+              <a:t>test.css</a:t>
+            </a:r>
+            <a:r>
+              <a:rPr lang="en-US" dirty="0">
+                <a:solidFill>
+                  <a:schemeClr val="bg1"/>
+                </a:solidFill>
+              </a:rPr>
+              <a:t> </a:t>
+            </a:r>
+            <a:br>
+              <a:rPr lang="de" dirty="0"/>
+            </a:br>
+            <a:endParaRPr lang="de" dirty="0"/>
+          </a:p>
+          <a:p>
+            <a:endParaRPr lang="en-US" dirty="0">
+              <a:solidFill>
+                <a:schemeClr val="bg1"/>
+              </a:solidFill>
+            </a:endParaRPr>
+          </a:p>
+          <a:p>
+            <a:endParaRPr lang="en-US" dirty="0"/>
+          </a:p>
+          <a:p>
+            <a:endParaRPr lang="en-US" dirty="0"/>
+          </a:p>
+          <a:p>
+            <a:pPr marL="0" indent="0">
+              <a:buNone/>
+            </a:pPr>
+            <a:endParaRPr lang="en-US" dirty="0"/>
+          </a:p>
+        </p:txBody>
+      </p:sp>
+    </p:spTree>
+    <p:extLst>
+      <p:ext uri="{BB962C8B-B14F-4D97-AF65-F5344CB8AC3E}">
+        <p14:creationId xmlns:p14="http://schemas.microsoft.com/office/powerpoint/2010/main" val="714050327"/>
+      </p:ext>
+    </p:extLst>
+  </p:cSld>
+  <p:clrMapOvr>
+    <a:masterClrMapping/>
+  </p:clrMapOvr>
+</p:sld>
+</file>
+
+<file path=ppt/slides/slide19.xml><?xml version="1.0" encoding="utf-8"?>
+<p:sld xmlns:a="http://schemas.openxmlformats.org/drawingml/2006/main" xmlns:r="http://schemas.openxmlformats.org/officeDocument/2006/relationships" xmlns:p="http://schemas.openxmlformats.org/presentationml/2006/main">
+  <p:cSld>
+    <p:spTree>
+      <p:nvGrpSpPr>
+        <p:cNvPr id="1" name=""/>
+        <p:cNvGrpSpPr/>
+        <p:nvPr/>
+      </p:nvGrpSpPr>
+      <p:grpSpPr>
+        <a:xfrm>
+          <a:off x="0" y="0"/>
+          <a:ext cx="0" cy="0"/>
+          <a:chOff x="0" y="0"/>
+          <a:chExt cx="0" cy="0"/>
+        </a:xfrm>
+      </p:grpSpPr>
+      <p:sp>
+        <p:nvSpPr>
+          <p:cNvPr id="2" name="Title 1">
+            <a:extLst>
+              <a:ext uri="{FF2B5EF4-FFF2-40B4-BE49-F238E27FC236}">
                 <a16:creationId xmlns:a16="http://schemas.microsoft.com/office/drawing/2014/main" id="{A7020877-FDF2-6F49-B60B-7998DC3AFAF4}"/>
               </a:ext>
             </a:extLst>
@@ -10902,7 +11007,135 @@
 </p:sld>
 </file>
 
-<file path=ppt/slides/slide19.xml><?xml version="1.0" encoding="utf-8"?>
+<file path=ppt/slides/slide2.xml><?xml version="1.0" encoding="utf-8"?>
+<p:sld xmlns:a="http://schemas.openxmlformats.org/drawingml/2006/main" xmlns:r="http://schemas.openxmlformats.org/officeDocument/2006/relationships" xmlns:p="http://schemas.openxmlformats.org/presentationml/2006/main">
+  <p:cSld>
+    <p:spTree>
+      <p:nvGrpSpPr>
+        <p:cNvPr id="1" name=""/>
+        <p:cNvGrpSpPr/>
+        <p:nvPr/>
+      </p:nvGrpSpPr>
+      <p:grpSpPr>
+        <a:xfrm>
+          <a:off x="0" y="0"/>
+          <a:ext cx="0" cy="0"/>
+          <a:chOff x="0" y="0"/>
+          <a:chExt cx="0" cy="0"/>
+        </a:xfrm>
+      </p:grpSpPr>
+      <p:sp>
+        <p:nvSpPr>
+          <p:cNvPr id="2" name="Titel 1">
+            <a:extLst>
+              <a:ext uri="{FF2B5EF4-FFF2-40B4-BE49-F238E27FC236}">
+                <a16:creationId xmlns:a16="http://schemas.microsoft.com/office/drawing/2014/main" id="{8B7E6138-C6E6-4D4C-9AE9-A3AEDF187A3C}"/>
+              </a:ext>
+            </a:extLst>
+          </p:cNvPr>
+          <p:cNvSpPr>
+            <a:spLocks noGrp="1"/>
+          </p:cNvSpPr>
+          <p:nvPr>
+            <p:ph type="title"/>
+          </p:nvPr>
+        </p:nvSpPr>
+        <p:spPr/>
+        <p:txBody>
+          <a:bodyPr/>
+          <a:lstStyle/>
+          <a:p>
+            <a:r>
+              <a:rPr lang="de-DE" dirty="0"/>
+              <a:t>SASS</a:t>
+            </a:r>
+          </a:p>
+        </p:txBody>
+      </p:sp>
+      <p:sp>
+        <p:nvSpPr>
+          <p:cNvPr id="3" name="Inhaltsplatzhalter 2">
+            <a:extLst>
+              <a:ext uri="{FF2B5EF4-FFF2-40B4-BE49-F238E27FC236}">
+                <a16:creationId xmlns:a16="http://schemas.microsoft.com/office/drawing/2014/main" id="{FD7686AB-CAA1-B641-92A4-7D3E31BE1F80}"/>
+              </a:ext>
+            </a:extLst>
+          </p:cNvPr>
+          <p:cNvSpPr>
+            <a:spLocks noGrp="1"/>
+          </p:cNvSpPr>
+          <p:nvPr>
+            <p:ph idx="1"/>
+          </p:nvPr>
+        </p:nvSpPr>
+        <p:spPr/>
+        <p:txBody>
+          <a:bodyPr/>
+          <a:lstStyle/>
+          <a:p>
+            <a:r>
+              <a:rPr lang="de-DE" dirty="0" err="1"/>
+              <a:t>Sass</a:t>
+            </a:r>
+            <a:r>
+              <a:rPr lang="de-DE" dirty="0"/>
+              <a:t> (</a:t>
+            </a:r>
+            <a:r>
+              <a:rPr lang="de-CH" dirty="0" err="1"/>
+              <a:t>Syntactically</a:t>
+            </a:r>
+            <a:r>
+              <a:rPr lang="de-CH" dirty="0"/>
+              <a:t> </a:t>
+            </a:r>
+            <a:r>
+              <a:rPr lang="de-CH" dirty="0" err="1"/>
+              <a:t>Awesome</a:t>
+            </a:r>
+            <a:r>
+              <a:rPr lang="de-CH" dirty="0"/>
+              <a:t> Stylesheets</a:t>
+            </a:r>
+            <a:r>
+              <a:rPr lang="de-DE" dirty="0"/>
+              <a:t>) ist eine Stylesheet Sprache, die als </a:t>
+            </a:r>
+            <a:r>
+              <a:rPr lang="de-CH" dirty="0"/>
+              <a:t>Präprozessor die Erzeugung von </a:t>
+            </a:r>
+            <a:r>
+              <a:rPr lang="de-CH" dirty="0" err="1"/>
+              <a:t>css</a:t>
+            </a:r>
+            <a:r>
+              <a:rPr lang="de-CH" dirty="0"/>
+              <a:t> (Cascading Style Sheets) erleichtert. </a:t>
+            </a:r>
+          </a:p>
+          <a:p>
+            <a:pPr marL="0" indent="0">
+              <a:buNone/>
+            </a:pPr>
+            <a:endParaRPr lang="de-DE" dirty="0"/>
+          </a:p>
+        </p:txBody>
+      </p:sp>
+    </p:spTree>
+    <p:extLst>
+      <p:ext uri="{BB962C8B-B14F-4D97-AF65-F5344CB8AC3E}">
+        <p14:creationId xmlns:p14="http://schemas.microsoft.com/office/powerpoint/2010/main" val="3365166742"/>
+      </p:ext>
+    </p:extLst>
+  </p:cSld>
+  <p:clrMapOvr>
+    <a:masterClrMapping/>
+  </p:clrMapOvr>
+</p:sld>
+</file>
+
+<file path=ppt/slides/slide20.xml><?xml version="1.0" encoding="utf-8"?>
 <p:sld xmlns:a="http://schemas.openxmlformats.org/drawingml/2006/main" xmlns:r="http://schemas.openxmlformats.org/officeDocument/2006/relationships" xmlns:p="http://schemas.openxmlformats.org/presentationml/2006/main">
   <p:cSld>
     <p:spTree>
@@ -11207,135 +11440,7 @@
 </p:sld>
 </file>
 
-<file path=ppt/slides/slide2.xml><?xml version="1.0" encoding="utf-8"?>
-<p:sld xmlns:a="http://schemas.openxmlformats.org/drawingml/2006/main" xmlns:r="http://schemas.openxmlformats.org/officeDocument/2006/relationships" xmlns:p="http://schemas.openxmlformats.org/presentationml/2006/main">
-  <p:cSld>
-    <p:spTree>
-      <p:nvGrpSpPr>
-        <p:cNvPr id="1" name=""/>
-        <p:cNvGrpSpPr/>
-        <p:nvPr/>
-      </p:nvGrpSpPr>
-      <p:grpSpPr>
-        <a:xfrm>
-          <a:off x="0" y="0"/>
-          <a:ext cx="0" cy="0"/>
-          <a:chOff x="0" y="0"/>
-          <a:chExt cx="0" cy="0"/>
-        </a:xfrm>
-      </p:grpSpPr>
-      <p:sp>
-        <p:nvSpPr>
-          <p:cNvPr id="2" name="Titel 1">
-            <a:extLst>
-              <a:ext uri="{FF2B5EF4-FFF2-40B4-BE49-F238E27FC236}">
-                <a16:creationId xmlns:a16="http://schemas.microsoft.com/office/drawing/2014/main" id="{8B7E6138-C6E6-4D4C-9AE9-A3AEDF187A3C}"/>
-              </a:ext>
-            </a:extLst>
-          </p:cNvPr>
-          <p:cNvSpPr>
-            <a:spLocks noGrp="1"/>
-          </p:cNvSpPr>
-          <p:nvPr>
-            <p:ph type="title"/>
-          </p:nvPr>
-        </p:nvSpPr>
-        <p:spPr/>
-        <p:txBody>
-          <a:bodyPr/>
-          <a:lstStyle/>
-          <a:p>
-            <a:r>
-              <a:rPr lang="de-DE" dirty="0"/>
-              <a:t>SASS</a:t>
-            </a:r>
-          </a:p>
-        </p:txBody>
-      </p:sp>
-      <p:sp>
-        <p:nvSpPr>
-          <p:cNvPr id="3" name="Inhaltsplatzhalter 2">
-            <a:extLst>
-              <a:ext uri="{FF2B5EF4-FFF2-40B4-BE49-F238E27FC236}">
-                <a16:creationId xmlns:a16="http://schemas.microsoft.com/office/drawing/2014/main" id="{FD7686AB-CAA1-B641-92A4-7D3E31BE1F80}"/>
-              </a:ext>
-            </a:extLst>
-          </p:cNvPr>
-          <p:cNvSpPr>
-            <a:spLocks noGrp="1"/>
-          </p:cNvSpPr>
-          <p:nvPr>
-            <p:ph idx="1"/>
-          </p:nvPr>
-        </p:nvSpPr>
-        <p:spPr/>
-        <p:txBody>
-          <a:bodyPr/>
-          <a:lstStyle/>
-          <a:p>
-            <a:r>
-              <a:rPr lang="de-DE" dirty="0" err="1"/>
-              <a:t>Sass</a:t>
-            </a:r>
-            <a:r>
-              <a:rPr lang="de-DE" dirty="0"/>
-              <a:t> (</a:t>
-            </a:r>
-            <a:r>
-              <a:rPr lang="de-CH" dirty="0" err="1"/>
-              <a:t>Syntactically</a:t>
-            </a:r>
-            <a:r>
-              <a:rPr lang="de-CH" dirty="0"/>
-              <a:t> </a:t>
-            </a:r>
-            <a:r>
-              <a:rPr lang="de-CH" dirty="0" err="1"/>
-              <a:t>Awesome</a:t>
-            </a:r>
-            <a:r>
-              <a:rPr lang="de-CH" dirty="0"/>
-              <a:t> Stylesheets</a:t>
-            </a:r>
-            <a:r>
-              <a:rPr lang="de-DE" dirty="0"/>
-              <a:t>) ist eine Stylesheet Sprache, die als </a:t>
-            </a:r>
-            <a:r>
-              <a:rPr lang="de-CH" dirty="0"/>
-              <a:t>Präprozessor die Erzeugung von </a:t>
-            </a:r>
-            <a:r>
-              <a:rPr lang="de-CH" dirty="0" err="1"/>
-              <a:t>css</a:t>
-            </a:r>
-            <a:r>
-              <a:rPr lang="de-CH" dirty="0"/>
-              <a:t> (Cascading Style Sheets) erleichtert. </a:t>
-            </a:r>
-          </a:p>
-          <a:p>
-            <a:pPr marL="0" indent="0">
-              <a:buNone/>
-            </a:pPr>
-            <a:endParaRPr lang="de-DE" dirty="0"/>
-          </a:p>
-        </p:txBody>
-      </p:sp>
-    </p:spTree>
-    <p:extLst>
-      <p:ext uri="{BB962C8B-B14F-4D97-AF65-F5344CB8AC3E}">
-        <p14:creationId xmlns:p14="http://schemas.microsoft.com/office/powerpoint/2010/main" val="3365166742"/>
-      </p:ext>
-    </p:extLst>
-  </p:cSld>
-  <p:clrMapOvr>
-    <a:masterClrMapping/>
-  </p:clrMapOvr>
-</p:sld>
-</file>
-
-<file path=ppt/slides/slide20.xml><?xml version="1.0" encoding="utf-8"?>
+<file path=ppt/slides/slide21.xml><?xml version="1.0" encoding="utf-8"?>
 <p:sld xmlns:a="http://schemas.openxmlformats.org/drawingml/2006/main" xmlns:r="http://schemas.openxmlformats.org/officeDocument/2006/relationships" xmlns:p="http://schemas.openxmlformats.org/presentationml/2006/main">
   <p:cSld>
     <p:spTree>
@@ -12163,7 +12268,7 @@
 </p:sld>
 </file>
 
-<file path=ppt/slides/slide21.xml><?xml version="1.0" encoding="utf-8"?>
+<file path=ppt/slides/slide22.xml><?xml version="1.0" encoding="utf-8"?>
 <p:sld xmlns:a="http://schemas.openxmlformats.org/drawingml/2006/main" xmlns:r="http://schemas.openxmlformats.org/officeDocument/2006/relationships" xmlns:p="http://schemas.openxmlformats.org/presentationml/2006/main">
   <p:cSld>
     <p:spTree>
@@ -12764,7 +12869,7 @@
 </p:sld>
 </file>
 
-<file path=ppt/slides/slide22.xml><?xml version="1.0" encoding="utf-8"?>
+<file path=ppt/slides/slide23.xml><?xml version="1.0" encoding="utf-8"?>
 <p:sld xmlns:a="http://schemas.openxmlformats.org/drawingml/2006/main" xmlns:r="http://schemas.openxmlformats.org/officeDocument/2006/relationships" xmlns:p="http://schemas.openxmlformats.org/presentationml/2006/main">
   <p:cSld>
     <p:spTree>
@@ -13161,7 +13266,7 @@
 </p:sld>
 </file>
 
-<file path=ppt/slides/slide23.xml><?xml version="1.0" encoding="utf-8"?>
+<file path=ppt/slides/slide24.xml><?xml version="1.0" encoding="utf-8"?>
 <p:sld xmlns:a="http://schemas.openxmlformats.org/drawingml/2006/main" xmlns:r="http://schemas.openxmlformats.org/officeDocument/2006/relationships" xmlns:p="http://schemas.openxmlformats.org/presentationml/2006/main">
   <p:cSld>
     <p:spTree>
@@ -13589,7 +13694,7 @@
 </p:sld>
 </file>
 
-<file path=ppt/slides/slide24.xml><?xml version="1.0" encoding="utf-8"?>
+<file path=ppt/slides/slide25.xml><?xml version="1.0" encoding="utf-8"?>
 <p:sld xmlns:a="http://schemas.openxmlformats.org/drawingml/2006/main" xmlns:r="http://schemas.openxmlformats.org/officeDocument/2006/relationships" xmlns:p="http://schemas.openxmlformats.org/presentationml/2006/main">
   <p:cSld>
     <p:spTree>
@@ -14083,7 +14188,7 @@
 </p:sld>
 </file>
 
-<file path=ppt/slides/slide25.xml><?xml version="1.0" encoding="utf-8"?>
+<file path=ppt/slides/slide26.xml><?xml version="1.0" encoding="utf-8"?>
 <p:sld xmlns:a="http://schemas.openxmlformats.org/drawingml/2006/main" xmlns:r="http://schemas.openxmlformats.org/officeDocument/2006/relationships" xmlns:p="http://schemas.openxmlformats.org/presentationml/2006/main">
   <p:cSld>
     <p:spTree>
@@ -14586,7 +14691,7 @@
 </p:sld>
 </file>
 
-<file path=ppt/slides/slide26.xml><?xml version="1.0" encoding="utf-8"?>
+<file path=ppt/slides/slide27.xml><?xml version="1.0" encoding="utf-8"?>
 <p:sld xmlns:a="http://schemas.openxmlformats.org/drawingml/2006/main" xmlns:r="http://schemas.openxmlformats.org/officeDocument/2006/relationships" xmlns:p="http://schemas.openxmlformats.org/presentationml/2006/main">
   <p:cSld>
     <p:spTree>
@@ -15533,7 +15638,7 @@
 </p:sld>
 </file>
 
-<file path=ppt/slides/slide27.xml><?xml version="1.0" encoding="utf-8"?>
+<file path=ppt/slides/slide28.xml><?xml version="1.0" encoding="utf-8"?>
 <p:sld xmlns:a="http://schemas.openxmlformats.org/drawingml/2006/main" xmlns:r="http://schemas.openxmlformats.org/officeDocument/2006/relationships" xmlns:p="http://schemas.openxmlformats.org/presentationml/2006/main">
   <p:cSld>
     <p:spTree>
@@ -16735,101 +16840,6 @@
 </p:sld>
 </file>
 
-<file path=ppt/slides/slide28.xml><?xml version="1.0" encoding="utf-8"?>
-<p:sld xmlns:a="http://schemas.openxmlformats.org/drawingml/2006/main" xmlns:r="http://schemas.openxmlformats.org/officeDocument/2006/relationships" xmlns:p="http://schemas.openxmlformats.org/presentationml/2006/main">
-  <p:cSld>
-    <p:spTree>
-      <p:nvGrpSpPr>
-        <p:cNvPr id="1" name=""/>
-        <p:cNvGrpSpPr/>
-        <p:nvPr/>
-      </p:nvGrpSpPr>
-      <p:grpSpPr>
-        <a:xfrm>
-          <a:off x="0" y="0"/>
-          <a:ext cx="0" cy="0"/>
-          <a:chOff x="0" y="0"/>
-          <a:chExt cx="0" cy="0"/>
-        </a:xfrm>
-      </p:grpSpPr>
-      <p:sp>
-        <p:nvSpPr>
-          <p:cNvPr id="2" name="Title 1">
-            <a:extLst>
-              <a:ext uri="{FF2B5EF4-FFF2-40B4-BE49-F238E27FC236}">
-                <a16:creationId xmlns:a16="http://schemas.microsoft.com/office/drawing/2014/main" id="{6EA8838F-1866-9145-909F-C4585DDF893E}"/>
-              </a:ext>
-            </a:extLst>
-          </p:cNvPr>
-          <p:cNvSpPr>
-            <a:spLocks noGrp="1"/>
-          </p:cNvSpPr>
-          <p:nvPr>
-            <p:ph type="title"/>
-          </p:nvPr>
-        </p:nvSpPr>
-        <p:spPr/>
-        <p:txBody>
-          <a:bodyPr/>
-          <a:lstStyle/>
-          <a:p>
-            <a:r>
-              <a:rPr lang="en-US" dirty="0" err="1"/>
-              <a:t>Unterschied</a:t>
-            </a:r>
-            <a:r>
-              <a:rPr lang="en-US" dirty="0"/>
-              <a:t>: </a:t>
-            </a:r>
-            <a:r>
-              <a:rPr lang="en-US" dirty="0" err="1"/>
-              <a:t>mixin</a:t>
-            </a:r>
-            <a:r>
-              <a:rPr lang="en-US" dirty="0"/>
-              <a:t> vs extend</a:t>
-            </a:r>
-          </a:p>
-        </p:txBody>
-      </p:sp>
-      <p:sp>
-        <p:nvSpPr>
-          <p:cNvPr id="3" name="Content Placeholder 2">
-            <a:extLst>
-              <a:ext uri="{FF2B5EF4-FFF2-40B4-BE49-F238E27FC236}">
-                <a16:creationId xmlns:a16="http://schemas.microsoft.com/office/drawing/2014/main" id="{EF188EBC-62F4-5D43-811D-6B1D2CA9C464}"/>
-              </a:ext>
-            </a:extLst>
-          </p:cNvPr>
-          <p:cNvSpPr>
-            <a:spLocks noGrp="1"/>
-          </p:cNvSpPr>
-          <p:nvPr>
-            <p:ph idx="1"/>
-          </p:nvPr>
-        </p:nvSpPr>
-        <p:spPr/>
-        <p:txBody>
-          <a:bodyPr/>
-          <a:lstStyle/>
-          <a:p>
-            <a:endParaRPr lang="en-US" dirty="0"/>
-          </a:p>
-        </p:txBody>
-      </p:sp>
-    </p:spTree>
-    <p:extLst>
-      <p:ext uri="{BB962C8B-B14F-4D97-AF65-F5344CB8AC3E}">
-        <p14:creationId xmlns:p14="http://schemas.microsoft.com/office/powerpoint/2010/main" val="1890938826"/>
-      </p:ext>
-    </p:extLst>
-  </p:cSld>
-  <p:clrMapOvr>
-    <a:masterClrMapping/>
-  </p:clrMapOvr>
-</p:sld>
-</file>
-
 <file path=ppt/slides/slide29.xml><?xml version="1.0" encoding="utf-8"?>
 <p:sld xmlns:a="http://schemas.openxmlformats.org/drawingml/2006/main" xmlns:r="http://schemas.openxmlformats.org/officeDocument/2006/relationships" xmlns:p="http://schemas.openxmlformats.org/presentationml/2006/main">
   <p:cSld>
@@ -16849,10 +16859,10 @@
       </p:grpSpPr>
       <p:sp>
         <p:nvSpPr>
-          <p:cNvPr id="2" name="Title 1">
+          <p:cNvPr id="2" name="Titel 1">
             <a:extLst>
               <a:ext uri="{FF2B5EF4-FFF2-40B4-BE49-F238E27FC236}">
-                <a16:creationId xmlns:a16="http://schemas.microsoft.com/office/drawing/2014/main" id="{BC526089-5BAD-E24F-9FA8-D57E3125952F}"/>
+                <a16:creationId xmlns:a16="http://schemas.microsoft.com/office/drawing/2014/main" id="{C4D2BDF5-5058-6D4F-9005-E4D0F15F7235}"/>
               </a:ext>
             </a:extLst>
           </p:cNvPr>
@@ -16869,19 +16879,27 @@
           <a:lstStyle/>
           <a:p>
             <a:r>
+              <a:rPr lang="de-DE" dirty="0" err="1"/>
+              <a:t>Extend</a:t>
+            </a:r>
+            <a:r>
               <a:rPr lang="de-DE" dirty="0"/>
-              <a:t>Literatur / Tutorials</a:t>
-            </a:r>
-            <a:endParaRPr lang="en-US" dirty="0"/>
+              <a:t> mit </a:t>
+            </a:r>
+            <a:r>
+              <a:rPr lang="de-DE" dirty="0" err="1"/>
+              <a:t>placeholder</a:t>
+            </a:r>
+            <a:endParaRPr lang="de-DE" dirty="0"/>
           </a:p>
         </p:txBody>
       </p:sp>
       <p:sp>
         <p:nvSpPr>
-          <p:cNvPr id="3" name="Content Placeholder 2">
+          <p:cNvPr id="3" name="Inhaltsplatzhalter 2">
             <a:extLst>
               <a:ext uri="{FF2B5EF4-FFF2-40B4-BE49-F238E27FC236}">
-                <a16:creationId xmlns:a16="http://schemas.microsoft.com/office/drawing/2014/main" id="{A8289C28-27A5-2940-AB9F-CC7584E8F117}"/>
+                <a16:creationId xmlns:a16="http://schemas.microsoft.com/office/drawing/2014/main" id="{6F53592B-0008-184D-8E4F-26AC34E17C10}"/>
               </a:ext>
             </a:extLst>
           </p:cNvPr>
@@ -16898,28 +16916,855 @@
           <a:lstStyle/>
           <a:p>
             <a:r>
-              <a:rPr lang="en-US" dirty="0">
-                <a:hlinkClick r:id="rId2"/>
-              </a:rPr>
-              <a:t>https://www.sassmeister.com/</a:t>
-            </a:r>
-            <a:endParaRPr lang="en-US" dirty="0"/>
-          </a:p>
-          <a:p>
-            <a:r>
-              <a:rPr lang="en-US" dirty="0">
-                <a:hlinkClick r:id="rId3"/>
-              </a:rPr>
-              <a:t>https://tutorialzine.com/2016/01/learn-sass-in-15-minutes</a:t>
-            </a:r>
-            <a:endParaRPr lang="en-US" dirty="0"/>
+              <a:rPr lang="de-CH" dirty="0"/>
+              <a:t>Verwendest du @</a:t>
+            </a:r>
+            <a:r>
+              <a:rPr lang="de-CH" dirty="0" err="1"/>
+              <a:t>extend</a:t>
+            </a:r>
+            <a:r>
+              <a:rPr lang="de-CH" dirty="0"/>
+              <a:t> mit normalen </a:t>
+            </a:r>
+            <a:r>
+              <a:rPr lang="de-CH" dirty="0" err="1"/>
+              <a:t>Selektoren</a:t>
+            </a:r>
+            <a:r>
+              <a:rPr lang="de-CH" dirty="0"/>
+              <a:t>, so werden diese ganz normal im CSS abgebildet. Möchtest du eine CSS-Klasse </a:t>
+            </a:r>
+            <a:r>
+              <a:rPr lang="de-CH" dirty="0" err="1"/>
+              <a:t>extenden</a:t>
+            </a:r>
+            <a:r>
+              <a:rPr lang="de-CH" dirty="0"/>
+              <a:t>, die dann nicht im CSS auftaucht, kannst du einen </a:t>
+            </a:r>
+            <a:r>
+              <a:rPr lang="de-CH" dirty="0" err="1"/>
+              <a:t>Placeholder</a:t>
+            </a:r>
+            <a:r>
+              <a:rPr lang="de-CH" dirty="0"/>
+              <a:t> </a:t>
+            </a:r>
+            <a:r>
+              <a:rPr lang="de-CH" dirty="0" err="1"/>
+              <a:t>Selektor</a:t>
+            </a:r>
+            <a:r>
+              <a:rPr lang="de-CH" dirty="0"/>
+              <a:t> verwenden. </a:t>
+            </a:r>
+          </a:p>
+          <a:p>
+            <a:endParaRPr lang="de-DE" dirty="0"/>
+          </a:p>
+        </p:txBody>
+      </p:sp>
+      <p:sp>
+        <p:nvSpPr>
+          <p:cNvPr id="4" name="Rechteck 11">
+            <a:extLst>
+              <a:ext uri="{FF2B5EF4-FFF2-40B4-BE49-F238E27FC236}">
+                <a16:creationId xmlns:a16="http://schemas.microsoft.com/office/drawing/2014/main" id="{AE094F4D-6029-E54B-BFED-073E1A47BEF3}"/>
+              </a:ext>
+            </a:extLst>
+          </p:cNvPr>
+          <p:cNvSpPr txBox="1">
+            <a:spLocks/>
+          </p:cNvSpPr>
+          <p:nvPr/>
+        </p:nvSpPr>
+        <p:spPr>
+          <a:xfrm>
+            <a:off x="1295818" y="4367363"/>
+            <a:ext cx="2975098" cy="2314329"/>
+          </a:xfrm>
+          <a:prstGeom prst="rect">
+            <a:avLst/>
+          </a:prstGeom>
+        </p:spPr>
+        <p:style>
+          <a:lnRef idx="2">
+            <a:schemeClr val="accent6"/>
+          </a:lnRef>
+          <a:fillRef idx="1">
+            <a:schemeClr val="lt1"/>
+          </a:fillRef>
+          <a:effectRef idx="0">
+            <a:schemeClr val="accent6"/>
+          </a:effectRef>
+          <a:fontRef idx="minor">
+            <a:schemeClr val="dk1"/>
+          </a:fontRef>
+        </p:style>
+        <p:txBody>
+          <a:bodyPr vert="horz" lIns="91440" tIns="45720" rIns="91440" bIns="45720" rtlCol="0" anchor="t">
+            <a:noAutofit/>
+          </a:bodyPr>
+          <a:lstStyle>
+            <a:lvl1pPr marL="228600" indent="-228600" algn="l" defTabSz="914400" rtl="0" eaLnBrk="1" latinLnBrk="0" hangingPunct="1">
+              <a:lnSpc>
+                <a:spcPct val="90000"/>
+              </a:lnSpc>
+              <a:spcBef>
+                <a:spcPts val="1000"/>
+              </a:spcBef>
+              <a:buFont typeface="Arial" panose="020B0604020202020204" pitchFamily="34" charset="0"/>
+              <a:buChar char="•"/>
+              <a:defRPr sz="2400" kern="1200">
+                <a:solidFill>
+                  <a:schemeClr val="dk1"/>
+                </a:solidFill>
+                <a:latin typeface="+mn-lt"/>
+                <a:ea typeface="+mn-ea"/>
+                <a:cs typeface="+mn-cs"/>
+              </a:defRPr>
+            </a:lvl1pPr>
+            <a:lvl2pPr marL="685800" indent="-228600" algn="l" defTabSz="914400" rtl="0" eaLnBrk="1" latinLnBrk="0" hangingPunct="1">
+              <a:lnSpc>
+                <a:spcPct val="90000"/>
+              </a:lnSpc>
+              <a:spcBef>
+                <a:spcPts val="500"/>
+              </a:spcBef>
+              <a:buFont typeface="Arial" panose="020B0604020202020204" pitchFamily="34" charset="0"/>
+              <a:buChar char="•"/>
+              <a:defRPr sz="2000" kern="1200">
+                <a:solidFill>
+                  <a:schemeClr val="dk1"/>
+                </a:solidFill>
+                <a:latin typeface="+mn-lt"/>
+                <a:ea typeface="+mn-ea"/>
+                <a:cs typeface="+mn-cs"/>
+              </a:defRPr>
+            </a:lvl2pPr>
+            <a:lvl3pPr marL="1143000" indent="-228600" algn="l" defTabSz="914400" rtl="0" eaLnBrk="1" latinLnBrk="0" hangingPunct="1">
+              <a:lnSpc>
+                <a:spcPct val="90000"/>
+              </a:lnSpc>
+              <a:spcBef>
+                <a:spcPts val="500"/>
+              </a:spcBef>
+              <a:buFont typeface="Arial" panose="020B0604020202020204" pitchFamily="34" charset="0"/>
+              <a:buChar char="•"/>
+              <a:defRPr sz="1800" kern="1200">
+                <a:solidFill>
+                  <a:schemeClr val="dk1"/>
+                </a:solidFill>
+                <a:latin typeface="+mn-lt"/>
+                <a:ea typeface="+mn-ea"/>
+                <a:cs typeface="+mn-cs"/>
+              </a:defRPr>
+            </a:lvl3pPr>
+            <a:lvl4pPr marL="1600200" indent="-228600" algn="l" defTabSz="914400" rtl="0" eaLnBrk="1" latinLnBrk="0" hangingPunct="1">
+              <a:lnSpc>
+                <a:spcPct val="90000"/>
+              </a:lnSpc>
+              <a:spcBef>
+                <a:spcPts val="500"/>
+              </a:spcBef>
+              <a:buFont typeface="Arial" panose="020B0604020202020204" pitchFamily="34" charset="0"/>
+              <a:buChar char="•"/>
+              <a:defRPr sz="1600" kern="1200">
+                <a:solidFill>
+                  <a:schemeClr val="dk1"/>
+                </a:solidFill>
+                <a:latin typeface="+mn-lt"/>
+                <a:ea typeface="+mn-ea"/>
+                <a:cs typeface="+mn-cs"/>
+              </a:defRPr>
+            </a:lvl4pPr>
+            <a:lvl5pPr marL="2057400" indent="-228600" algn="l" defTabSz="914400" rtl="0" eaLnBrk="1" latinLnBrk="0" hangingPunct="1">
+              <a:lnSpc>
+                <a:spcPct val="90000"/>
+              </a:lnSpc>
+              <a:spcBef>
+                <a:spcPts val="500"/>
+              </a:spcBef>
+              <a:buFont typeface="Arial" panose="020B0604020202020204" pitchFamily="34" charset="0"/>
+              <a:buChar char="•"/>
+              <a:defRPr sz="1600" kern="1200">
+                <a:solidFill>
+                  <a:schemeClr val="dk1"/>
+                </a:solidFill>
+                <a:latin typeface="+mn-lt"/>
+                <a:ea typeface="+mn-ea"/>
+                <a:cs typeface="+mn-cs"/>
+              </a:defRPr>
+            </a:lvl5pPr>
+            <a:lvl6pPr marL="2514600" indent="-228600" algn="l" defTabSz="914400" rtl="0" eaLnBrk="1" latinLnBrk="0" hangingPunct="1">
+              <a:lnSpc>
+                <a:spcPct val="90000"/>
+              </a:lnSpc>
+              <a:spcBef>
+                <a:spcPts val="500"/>
+              </a:spcBef>
+              <a:buFont typeface="Arial" panose="020B0604020202020204" pitchFamily="34" charset="0"/>
+              <a:buChar char="•"/>
+              <a:defRPr sz="1400" kern="1200">
+                <a:solidFill>
+                  <a:schemeClr val="dk1"/>
+                </a:solidFill>
+                <a:latin typeface="+mn-lt"/>
+                <a:ea typeface="+mn-ea"/>
+                <a:cs typeface="+mn-cs"/>
+              </a:defRPr>
+            </a:lvl6pPr>
+            <a:lvl7pPr marL="2971800" indent="-228600" algn="l" defTabSz="914400" rtl="0" eaLnBrk="1" latinLnBrk="0" hangingPunct="1">
+              <a:lnSpc>
+                <a:spcPct val="90000"/>
+              </a:lnSpc>
+              <a:spcBef>
+                <a:spcPts val="500"/>
+              </a:spcBef>
+              <a:buFont typeface="Arial" panose="020B0604020202020204" pitchFamily="34" charset="0"/>
+              <a:buChar char="•"/>
+              <a:defRPr sz="1400" kern="1200">
+                <a:solidFill>
+                  <a:schemeClr val="dk1"/>
+                </a:solidFill>
+                <a:latin typeface="+mn-lt"/>
+                <a:ea typeface="+mn-ea"/>
+                <a:cs typeface="+mn-cs"/>
+              </a:defRPr>
+            </a:lvl7pPr>
+            <a:lvl8pPr marL="3429000" indent="-228600" algn="l" defTabSz="914400" rtl="0" eaLnBrk="1" latinLnBrk="0" hangingPunct="1">
+              <a:lnSpc>
+                <a:spcPct val="90000"/>
+              </a:lnSpc>
+              <a:spcBef>
+                <a:spcPts val="500"/>
+              </a:spcBef>
+              <a:buFont typeface="Arial" panose="020B0604020202020204" pitchFamily="34" charset="0"/>
+              <a:buChar char="•"/>
+              <a:defRPr sz="1400" kern="1200">
+                <a:solidFill>
+                  <a:schemeClr val="dk1"/>
+                </a:solidFill>
+                <a:latin typeface="+mn-lt"/>
+                <a:ea typeface="+mn-ea"/>
+                <a:cs typeface="+mn-cs"/>
+              </a:defRPr>
+            </a:lvl8pPr>
+            <a:lvl9pPr marL="3886200" indent="-228600" algn="l" defTabSz="914400" rtl="0" eaLnBrk="1" latinLnBrk="0" hangingPunct="1">
+              <a:lnSpc>
+                <a:spcPct val="90000"/>
+              </a:lnSpc>
+              <a:spcBef>
+                <a:spcPts val="500"/>
+              </a:spcBef>
+              <a:buFont typeface="Arial" panose="020B0604020202020204" pitchFamily="34" charset="0"/>
+              <a:buChar char="•"/>
+              <a:defRPr sz="1400" kern="1200">
+                <a:solidFill>
+                  <a:schemeClr val="dk1"/>
+                </a:solidFill>
+                <a:latin typeface="+mn-lt"/>
+                <a:ea typeface="+mn-ea"/>
+                <a:cs typeface="+mn-cs"/>
+              </a:defRPr>
+            </a:lvl9pPr>
+          </a:lstStyle>
+          <a:p>
+            <a:pPr marL="0" indent="0">
+              <a:buNone/>
+            </a:pPr>
+            <a:r>
+              <a:rPr lang="de-CH" sz="1800" dirty="0">
+                <a:latin typeface="Arial" panose="020B0604020202020204" pitchFamily="34" charset="0"/>
+                <a:cs typeface="Arial" panose="020B0604020202020204" pitchFamily="34" charset="0"/>
+              </a:rPr>
+              <a:t>%</a:t>
+            </a:r>
+            <a:r>
+              <a:rPr lang="de-CH" sz="1800" dirty="0" err="1">
+                <a:latin typeface="Arial" panose="020B0604020202020204" pitchFamily="34" charset="0"/>
+                <a:cs typeface="Arial" panose="020B0604020202020204" pitchFamily="34" charset="0"/>
+              </a:rPr>
+              <a:t>stuff</a:t>
+            </a:r>
+            <a:r>
+              <a:rPr lang="de-CH" sz="1800" dirty="0">
+                <a:latin typeface="Arial" panose="020B0604020202020204" pitchFamily="34" charset="0"/>
+                <a:cs typeface="Arial" panose="020B0604020202020204" pitchFamily="34" charset="0"/>
+              </a:rPr>
+              <a:t> { </a:t>
+            </a:r>
+            <a:br>
+              <a:rPr lang="de-CH" sz="1800" dirty="0">
+                <a:latin typeface="Arial" panose="020B0604020202020204" pitchFamily="34" charset="0"/>
+                <a:cs typeface="Arial" panose="020B0604020202020204" pitchFamily="34" charset="0"/>
+              </a:rPr>
+            </a:br>
+            <a:r>
+              <a:rPr lang="de-CH" sz="1800" dirty="0">
+                <a:latin typeface="Arial" panose="020B0604020202020204" pitchFamily="34" charset="0"/>
+                <a:cs typeface="Arial" panose="020B0604020202020204" pitchFamily="34" charset="0"/>
+              </a:rPr>
+              <a:t>    </a:t>
+            </a:r>
+            <a:r>
+              <a:rPr lang="de-CH" sz="1800" dirty="0" err="1">
+                <a:latin typeface="Arial" panose="020B0604020202020204" pitchFamily="34" charset="0"/>
+                <a:cs typeface="Arial" panose="020B0604020202020204" pitchFamily="34" charset="0"/>
+              </a:rPr>
+              <a:t>font</a:t>
+            </a:r>
+            <a:r>
+              <a:rPr lang="de-CH" sz="1800" dirty="0">
+                <a:latin typeface="Arial" panose="020B0604020202020204" pitchFamily="34" charset="0"/>
+                <a:cs typeface="Arial" panose="020B0604020202020204" pitchFamily="34" charset="0"/>
+              </a:rPr>
+              <a:t>-size: 12px; </a:t>
+            </a:r>
+            <a:br>
+              <a:rPr lang="de-CH" sz="1800" dirty="0">
+                <a:latin typeface="Arial" panose="020B0604020202020204" pitchFamily="34" charset="0"/>
+                <a:cs typeface="Arial" panose="020B0604020202020204" pitchFamily="34" charset="0"/>
+              </a:rPr>
+            </a:br>
+            <a:r>
+              <a:rPr lang="de-CH" sz="1800" dirty="0">
+                <a:latin typeface="Arial" panose="020B0604020202020204" pitchFamily="34" charset="0"/>
+                <a:cs typeface="Arial" panose="020B0604020202020204" pitchFamily="34" charset="0"/>
+              </a:rPr>
+              <a:t>    </a:t>
+            </a:r>
+            <a:r>
+              <a:rPr lang="de-CH" sz="1800" dirty="0" err="1">
+                <a:latin typeface="Arial" panose="020B0604020202020204" pitchFamily="34" charset="0"/>
+                <a:cs typeface="Arial" panose="020B0604020202020204" pitchFamily="34" charset="0"/>
+              </a:rPr>
+              <a:t>color</a:t>
+            </a:r>
+            <a:r>
+              <a:rPr lang="de-CH" sz="1800" dirty="0">
+                <a:latin typeface="Arial" panose="020B0604020202020204" pitchFamily="34" charset="0"/>
+                <a:cs typeface="Arial" panose="020B0604020202020204" pitchFamily="34" charset="0"/>
+              </a:rPr>
+              <a:t>: </a:t>
+            </a:r>
+            <a:r>
+              <a:rPr lang="de-CH" sz="1800" dirty="0" err="1">
+                <a:latin typeface="Arial" panose="020B0604020202020204" pitchFamily="34" charset="0"/>
+                <a:cs typeface="Arial" panose="020B0604020202020204" pitchFamily="34" charset="0"/>
+              </a:rPr>
+              <a:t>red</a:t>
+            </a:r>
+            <a:r>
+              <a:rPr lang="de-CH" sz="1800" dirty="0">
+                <a:latin typeface="Arial" panose="020B0604020202020204" pitchFamily="34" charset="0"/>
+                <a:cs typeface="Arial" panose="020B0604020202020204" pitchFamily="34" charset="0"/>
+              </a:rPr>
+              <a:t>; </a:t>
+            </a:r>
+            <a:br>
+              <a:rPr lang="de-CH" sz="1800" dirty="0">
+                <a:latin typeface="Arial" panose="020B0604020202020204" pitchFamily="34" charset="0"/>
+                <a:cs typeface="Arial" panose="020B0604020202020204" pitchFamily="34" charset="0"/>
+              </a:rPr>
+            </a:br>
+            <a:r>
+              <a:rPr lang="de-CH" sz="1800" dirty="0">
+                <a:latin typeface="Arial" panose="020B0604020202020204" pitchFamily="34" charset="0"/>
+                <a:cs typeface="Arial" panose="020B0604020202020204" pitchFamily="34" charset="0"/>
+              </a:rPr>
+              <a:t>} </a:t>
+            </a:r>
+          </a:p>
+          <a:p>
+            <a:pPr marL="0" indent="0">
+              <a:buNone/>
+            </a:pPr>
+            <a:br>
+              <a:rPr lang="de-CH" sz="1800" dirty="0">
+                <a:latin typeface="Arial" panose="020B0604020202020204" pitchFamily="34" charset="0"/>
+                <a:cs typeface="Arial" panose="020B0604020202020204" pitchFamily="34" charset="0"/>
+              </a:rPr>
+            </a:br>
+            <a:r>
+              <a:rPr lang="de-CH" sz="1800" dirty="0">
+                <a:latin typeface="Arial" panose="020B0604020202020204" pitchFamily="34" charset="0"/>
+                <a:cs typeface="Arial" panose="020B0604020202020204" pitchFamily="34" charset="0"/>
+              </a:rPr>
+              <a:t>.</a:t>
+            </a:r>
+            <a:r>
+              <a:rPr lang="de-CH" sz="1800" dirty="0" err="1">
+                <a:latin typeface="Arial" panose="020B0604020202020204" pitchFamily="34" charset="0"/>
+                <a:cs typeface="Arial" panose="020B0604020202020204" pitchFamily="34" charset="0"/>
+              </a:rPr>
+              <a:t>foo</a:t>
+            </a:r>
+            <a:r>
+              <a:rPr lang="de-CH" sz="1800" dirty="0">
+                <a:latin typeface="Arial" panose="020B0604020202020204" pitchFamily="34" charset="0"/>
+                <a:cs typeface="Arial" panose="020B0604020202020204" pitchFamily="34" charset="0"/>
+              </a:rPr>
+              <a:t> { </a:t>
+            </a:r>
+            <a:br>
+              <a:rPr lang="de-CH" sz="1800" dirty="0">
+                <a:latin typeface="Arial" panose="020B0604020202020204" pitchFamily="34" charset="0"/>
+                <a:cs typeface="Arial" panose="020B0604020202020204" pitchFamily="34" charset="0"/>
+              </a:rPr>
+            </a:br>
+            <a:r>
+              <a:rPr lang="de-CH" sz="1800" dirty="0">
+                <a:latin typeface="Arial" panose="020B0604020202020204" pitchFamily="34" charset="0"/>
+                <a:cs typeface="Arial" panose="020B0604020202020204" pitchFamily="34" charset="0"/>
+              </a:rPr>
+              <a:t>    @</a:t>
+            </a:r>
+            <a:r>
+              <a:rPr lang="de-CH" sz="1800" dirty="0" err="1">
+                <a:latin typeface="Arial" panose="020B0604020202020204" pitchFamily="34" charset="0"/>
+                <a:cs typeface="Arial" panose="020B0604020202020204" pitchFamily="34" charset="0"/>
+              </a:rPr>
+              <a:t>extend</a:t>
+            </a:r>
+            <a:r>
+              <a:rPr lang="de-CH" sz="1800" dirty="0">
+                <a:latin typeface="Arial" panose="020B0604020202020204" pitchFamily="34" charset="0"/>
+                <a:cs typeface="Arial" panose="020B0604020202020204" pitchFamily="34" charset="0"/>
+              </a:rPr>
+              <a:t> %</a:t>
+            </a:r>
+            <a:r>
+              <a:rPr lang="de-CH" sz="1800" dirty="0" err="1">
+                <a:latin typeface="Arial" panose="020B0604020202020204" pitchFamily="34" charset="0"/>
+                <a:cs typeface="Arial" panose="020B0604020202020204" pitchFamily="34" charset="0"/>
+              </a:rPr>
+              <a:t>stuff</a:t>
+            </a:r>
+            <a:r>
+              <a:rPr lang="de-CH" sz="1800" dirty="0">
+                <a:latin typeface="Arial" panose="020B0604020202020204" pitchFamily="34" charset="0"/>
+                <a:cs typeface="Arial" panose="020B0604020202020204" pitchFamily="34" charset="0"/>
+              </a:rPr>
+              <a:t>; </a:t>
+            </a:r>
+            <a:br>
+              <a:rPr lang="de-CH" sz="1800" dirty="0">
+                <a:latin typeface="Arial" panose="020B0604020202020204" pitchFamily="34" charset="0"/>
+                <a:cs typeface="Arial" panose="020B0604020202020204" pitchFamily="34" charset="0"/>
+              </a:rPr>
+            </a:br>
+            <a:r>
+              <a:rPr lang="de-CH" sz="1800" dirty="0">
+                <a:latin typeface="Arial" panose="020B0604020202020204" pitchFamily="34" charset="0"/>
+                <a:cs typeface="Arial" panose="020B0604020202020204" pitchFamily="34" charset="0"/>
+              </a:rPr>
+              <a:t>} </a:t>
+            </a:r>
+            <a:endParaRPr lang="de-CH" sz="1800" dirty="0">
+              <a:effectLst/>
+              <a:latin typeface="Arial" panose="020B0604020202020204" pitchFamily="34" charset="0"/>
+              <a:cs typeface="Arial" panose="020B0604020202020204" pitchFamily="34" charset="0"/>
+            </a:endParaRPr>
+          </a:p>
+        </p:txBody>
+      </p:sp>
+      <p:sp>
+        <p:nvSpPr>
+          <p:cNvPr id="5" name="Rechteck 11">
+            <a:extLst>
+              <a:ext uri="{FF2B5EF4-FFF2-40B4-BE49-F238E27FC236}">
+                <a16:creationId xmlns:a16="http://schemas.microsoft.com/office/drawing/2014/main" id="{0293EB41-0A5A-484C-9BF5-D10BC1EDD621}"/>
+              </a:ext>
+            </a:extLst>
+          </p:cNvPr>
+          <p:cNvSpPr txBox="1">
+            <a:spLocks/>
+          </p:cNvSpPr>
+          <p:nvPr/>
+        </p:nvSpPr>
+        <p:spPr>
+          <a:xfrm>
+            <a:off x="5795000" y="4367362"/>
+            <a:ext cx="2975098" cy="2314329"/>
+          </a:xfrm>
+          <a:prstGeom prst="rect">
+            <a:avLst/>
+          </a:prstGeom>
+        </p:spPr>
+        <p:style>
+          <a:lnRef idx="2">
+            <a:schemeClr val="accent6"/>
+          </a:lnRef>
+          <a:fillRef idx="1">
+            <a:schemeClr val="lt1"/>
+          </a:fillRef>
+          <a:effectRef idx="0">
+            <a:schemeClr val="accent6"/>
+          </a:effectRef>
+          <a:fontRef idx="minor">
+            <a:schemeClr val="dk1"/>
+          </a:fontRef>
+        </p:style>
+        <p:txBody>
+          <a:bodyPr vert="horz" lIns="91440" tIns="45720" rIns="91440" bIns="45720" rtlCol="0" anchor="t">
+            <a:noAutofit/>
+          </a:bodyPr>
+          <a:lstStyle>
+            <a:lvl1pPr marL="228600" indent="-228600" algn="l" defTabSz="914400" rtl="0" eaLnBrk="1" latinLnBrk="0" hangingPunct="1">
+              <a:lnSpc>
+                <a:spcPct val="90000"/>
+              </a:lnSpc>
+              <a:spcBef>
+                <a:spcPts val="1000"/>
+              </a:spcBef>
+              <a:buFont typeface="Arial" panose="020B0604020202020204" pitchFamily="34" charset="0"/>
+              <a:buChar char="•"/>
+              <a:defRPr sz="2400" kern="1200">
+                <a:solidFill>
+                  <a:schemeClr val="dk1"/>
+                </a:solidFill>
+                <a:latin typeface="+mn-lt"/>
+                <a:ea typeface="+mn-ea"/>
+                <a:cs typeface="+mn-cs"/>
+              </a:defRPr>
+            </a:lvl1pPr>
+            <a:lvl2pPr marL="685800" indent="-228600" algn="l" defTabSz="914400" rtl="0" eaLnBrk="1" latinLnBrk="0" hangingPunct="1">
+              <a:lnSpc>
+                <a:spcPct val="90000"/>
+              </a:lnSpc>
+              <a:spcBef>
+                <a:spcPts val="500"/>
+              </a:spcBef>
+              <a:buFont typeface="Arial" panose="020B0604020202020204" pitchFamily="34" charset="0"/>
+              <a:buChar char="•"/>
+              <a:defRPr sz="2000" kern="1200">
+                <a:solidFill>
+                  <a:schemeClr val="dk1"/>
+                </a:solidFill>
+                <a:latin typeface="+mn-lt"/>
+                <a:ea typeface="+mn-ea"/>
+                <a:cs typeface="+mn-cs"/>
+              </a:defRPr>
+            </a:lvl2pPr>
+            <a:lvl3pPr marL="1143000" indent="-228600" algn="l" defTabSz="914400" rtl="0" eaLnBrk="1" latinLnBrk="0" hangingPunct="1">
+              <a:lnSpc>
+                <a:spcPct val="90000"/>
+              </a:lnSpc>
+              <a:spcBef>
+                <a:spcPts val="500"/>
+              </a:spcBef>
+              <a:buFont typeface="Arial" panose="020B0604020202020204" pitchFamily="34" charset="0"/>
+              <a:buChar char="•"/>
+              <a:defRPr sz="1800" kern="1200">
+                <a:solidFill>
+                  <a:schemeClr val="dk1"/>
+                </a:solidFill>
+                <a:latin typeface="+mn-lt"/>
+                <a:ea typeface="+mn-ea"/>
+                <a:cs typeface="+mn-cs"/>
+              </a:defRPr>
+            </a:lvl3pPr>
+            <a:lvl4pPr marL="1600200" indent="-228600" algn="l" defTabSz="914400" rtl="0" eaLnBrk="1" latinLnBrk="0" hangingPunct="1">
+              <a:lnSpc>
+                <a:spcPct val="90000"/>
+              </a:lnSpc>
+              <a:spcBef>
+                <a:spcPts val="500"/>
+              </a:spcBef>
+              <a:buFont typeface="Arial" panose="020B0604020202020204" pitchFamily="34" charset="0"/>
+              <a:buChar char="•"/>
+              <a:defRPr sz="1600" kern="1200">
+                <a:solidFill>
+                  <a:schemeClr val="dk1"/>
+                </a:solidFill>
+                <a:latin typeface="+mn-lt"/>
+                <a:ea typeface="+mn-ea"/>
+                <a:cs typeface="+mn-cs"/>
+              </a:defRPr>
+            </a:lvl4pPr>
+            <a:lvl5pPr marL="2057400" indent="-228600" algn="l" defTabSz="914400" rtl="0" eaLnBrk="1" latinLnBrk="0" hangingPunct="1">
+              <a:lnSpc>
+                <a:spcPct val="90000"/>
+              </a:lnSpc>
+              <a:spcBef>
+                <a:spcPts val="500"/>
+              </a:spcBef>
+              <a:buFont typeface="Arial" panose="020B0604020202020204" pitchFamily="34" charset="0"/>
+              <a:buChar char="•"/>
+              <a:defRPr sz="1600" kern="1200">
+                <a:solidFill>
+                  <a:schemeClr val="dk1"/>
+                </a:solidFill>
+                <a:latin typeface="+mn-lt"/>
+                <a:ea typeface="+mn-ea"/>
+                <a:cs typeface="+mn-cs"/>
+              </a:defRPr>
+            </a:lvl5pPr>
+            <a:lvl6pPr marL="2514600" indent="-228600" algn="l" defTabSz="914400" rtl="0" eaLnBrk="1" latinLnBrk="0" hangingPunct="1">
+              <a:lnSpc>
+                <a:spcPct val="90000"/>
+              </a:lnSpc>
+              <a:spcBef>
+                <a:spcPts val="500"/>
+              </a:spcBef>
+              <a:buFont typeface="Arial" panose="020B0604020202020204" pitchFamily="34" charset="0"/>
+              <a:buChar char="•"/>
+              <a:defRPr sz="1400" kern="1200">
+                <a:solidFill>
+                  <a:schemeClr val="dk1"/>
+                </a:solidFill>
+                <a:latin typeface="+mn-lt"/>
+                <a:ea typeface="+mn-ea"/>
+                <a:cs typeface="+mn-cs"/>
+              </a:defRPr>
+            </a:lvl6pPr>
+            <a:lvl7pPr marL="2971800" indent="-228600" algn="l" defTabSz="914400" rtl="0" eaLnBrk="1" latinLnBrk="0" hangingPunct="1">
+              <a:lnSpc>
+                <a:spcPct val="90000"/>
+              </a:lnSpc>
+              <a:spcBef>
+                <a:spcPts val="500"/>
+              </a:spcBef>
+              <a:buFont typeface="Arial" panose="020B0604020202020204" pitchFamily="34" charset="0"/>
+              <a:buChar char="•"/>
+              <a:defRPr sz="1400" kern="1200">
+                <a:solidFill>
+                  <a:schemeClr val="dk1"/>
+                </a:solidFill>
+                <a:latin typeface="+mn-lt"/>
+                <a:ea typeface="+mn-ea"/>
+                <a:cs typeface="+mn-cs"/>
+              </a:defRPr>
+            </a:lvl7pPr>
+            <a:lvl8pPr marL="3429000" indent="-228600" algn="l" defTabSz="914400" rtl="0" eaLnBrk="1" latinLnBrk="0" hangingPunct="1">
+              <a:lnSpc>
+                <a:spcPct val="90000"/>
+              </a:lnSpc>
+              <a:spcBef>
+                <a:spcPts val="500"/>
+              </a:spcBef>
+              <a:buFont typeface="Arial" panose="020B0604020202020204" pitchFamily="34" charset="0"/>
+              <a:buChar char="•"/>
+              <a:defRPr sz="1400" kern="1200">
+                <a:solidFill>
+                  <a:schemeClr val="dk1"/>
+                </a:solidFill>
+                <a:latin typeface="+mn-lt"/>
+                <a:ea typeface="+mn-ea"/>
+                <a:cs typeface="+mn-cs"/>
+              </a:defRPr>
+            </a:lvl8pPr>
+            <a:lvl9pPr marL="3886200" indent="-228600" algn="l" defTabSz="914400" rtl="0" eaLnBrk="1" latinLnBrk="0" hangingPunct="1">
+              <a:lnSpc>
+                <a:spcPct val="90000"/>
+              </a:lnSpc>
+              <a:spcBef>
+                <a:spcPts val="500"/>
+              </a:spcBef>
+              <a:buFont typeface="Arial" panose="020B0604020202020204" pitchFamily="34" charset="0"/>
+              <a:buChar char="•"/>
+              <a:defRPr sz="1400" kern="1200">
+                <a:solidFill>
+                  <a:schemeClr val="dk1"/>
+                </a:solidFill>
+                <a:latin typeface="+mn-lt"/>
+                <a:ea typeface="+mn-ea"/>
+                <a:cs typeface="+mn-cs"/>
+              </a:defRPr>
+            </a:lvl9pPr>
+          </a:lstStyle>
+          <a:p>
+            <a:pPr marL="0" indent="0">
+              <a:buNone/>
+            </a:pPr>
+            <a:r>
+              <a:rPr lang="de-CH" sz="1800" dirty="0">
+                <a:latin typeface="Arial" panose="020B0604020202020204" pitchFamily="34" charset="0"/>
+                <a:cs typeface="Arial" panose="020B0604020202020204" pitchFamily="34" charset="0"/>
+              </a:rPr>
+              <a:t>.</a:t>
+            </a:r>
+            <a:r>
+              <a:rPr lang="de-CH" sz="1800" dirty="0" err="1">
+                <a:latin typeface="Arial" panose="020B0604020202020204" pitchFamily="34" charset="0"/>
+                <a:cs typeface="Arial" panose="020B0604020202020204" pitchFamily="34" charset="0"/>
+              </a:rPr>
+              <a:t>foo</a:t>
+            </a:r>
+            <a:r>
+              <a:rPr lang="de-CH" sz="1800" dirty="0">
+                <a:latin typeface="Arial" panose="020B0604020202020204" pitchFamily="34" charset="0"/>
+                <a:cs typeface="Arial" panose="020B0604020202020204" pitchFamily="34" charset="0"/>
+              </a:rPr>
+              <a:t> { </a:t>
+            </a:r>
+            <a:br>
+              <a:rPr lang="de-CH" sz="1800" dirty="0">
+                <a:latin typeface="Arial" panose="020B0604020202020204" pitchFamily="34" charset="0"/>
+                <a:cs typeface="Arial" panose="020B0604020202020204" pitchFamily="34" charset="0"/>
+              </a:rPr>
+            </a:br>
+            <a:r>
+              <a:rPr lang="de-CH" sz="1800" dirty="0">
+                <a:latin typeface="Arial" panose="020B0604020202020204" pitchFamily="34" charset="0"/>
+                <a:cs typeface="Arial" panose="020B0604020202020204" pitchFamily="34" charset="0"/>
+              </a:rPr>
+              <a:t>    </a:t>
+            </a:r>
+            <a:r>
+              <a:rPr lang="de-CH" sz="1800" dirty="0" err="1">
+                <a:latin typeface="Arial" panose="020B0604020202020204" pitchFamily="34" charset="0"/>
+                <a:cs typeface="Arial" panose="020B0604020202020204" pitchFamily="34" charset="0"/>
+              </a:rPr>
+              <a:t>font</a:t>
+            </a:r>
+            <a:r>
+              <a:rPr lang="de-CH" sz="1800" dirty="0">
+                <a:latin typeface="Arial" panose="020B0604020202020204" pitchFamily="34" charset="0"/>
+                <a:cs typeface="Arial" panose="020B0604020202020204" pitchFamily="34" charset="0"/>
+              </a:rPr>
+              <a:t>-size: 12px; </a:t>
+            </a:r>
+            <a:br>
+              <a:rPr lang="de-CH" sz="1800" dirty="0">
+                <a:latin typeface="Arial" panose="020B0604020202020204" pitchFamily="34" charset="0"/>
+                <a:cs typeface="Arial" panose="020B0604020202020204" pitchFamily="34" charset="0"/>
+              </a:rPr>
+            </a:br>
+            <a:r>
+              <a:rPr lang="de-CH" sz="1800" dirty="0">
+                <a:latin typeface="Arial" panose="020B0604020202020204" pitchFamily="34" charset="0"/>
+                <a:cs typeface="Arial" panose="020B0604020202020204" pitchFamily="34" charset="0"/>
+              </a:rPr>
+              <a:t>    </a:t>
+            </a:r>
+            <a:r>
+              <a:rPr lang="de-CH" sz="1800" dirty="0" err="1">
+                <a:latin typeface="Arial" panose="020B0604020202020204" pitchFamily="34" charset="0"/>
+                <a:cs typeface="Arial" panose="020B0604020202020204" pitchFamily="34" charset="0"/>
+              </a:rPr>
+              <a:t>color</a:t>
+            </a:r>
+            <a:r>
+              <a:rPr lang="de-CH" sz="1800" dirty="0">
+                <a:latin typeface="Arial" panose="020B0604020202020204" pitchFamily="34" charset="0"/>
+                <a:cs typeface="Arial" panose="020B0604020202020204" pitchFamily="34" charset="0"/>
+              </a:rPr>
+              <a:t>: </a:t>
+            </a:r>
+            <a:r>
+              <a:rPr lang="de-CH" sz="1800" dirty="0" err="1">
+                <a:latin typeface="Arial" panose="020B0604020202020204" pitchFamily="34" charset="0"/>
+                <a:cs typeface="Arial" panose="020B0604020202020204" pitchFamily="34" charset="0"/>
+              </a:rPr>
+              <a:t>red</a:t>
+            </a:r>
+            <a:r>
+              <a:rPr lang="de-CH" sz="1800" dirty="0">
+                <a:latin typeface="Arial" panose="020B0604020202020204" pitchFamily="34" charset="0"/>
+                <a:cs typeface="Arial" panose="020B0604020202020204" pitchFamily="34" charset="0"/>
+              </a:rPr>
+              <a:t>; </a:t>
+            </a:r>
+            <a:br>
+              <a:rPr lang="de-CH" sz="1800" dirty="0">
+                <a:latin typeface="Arial" panose="020B0604020202020204" pitchFamily="34" charset="0"/>
+                <a:cs typeface="Arial" panose="020B0604020202020204" pitchFamily="34" charset="0"/>
+              </a:rPr>
+            </a:br>
+            <a:r>
+              <a:rPr lang="de-CH" sz="1800" dirty="0">
+                <a:latin typeface="Arial" panose="020B0604020202020204" pitchFamily="34" charset="0"/>
+                <a:cs typeface="Arial" panose="020B0604020202020204" pitchFamily="34" charset="0"/>
+              </a:rPr>
+              <a:t>} </a:t>
+            </a:r>
+            <a:endParaRPr lang="de-CH" sz="1800" dirty="0">
+              <a:effectLst/>
+              <a:latin typeface="Arial" panose="020B0604020202020204" pitchFamily="34" charset="0"/>
+              <a:cs typeface="Arial" panose="020B0604020202020204" pitchFamily="34" charset="0"/>
+            </a:endParaRPr>
+          </a:p>
+        </p:txBody>
+      </p:sp>
+      <p:sp>
+        <p:nvSpPr>
+          <p:cNvPr id="6" name="TextBox 6">
+            <a:extLst>
+              <a:ext uri="{FF2B5EF4-FFF2-40B4-BE49-F238E27FC236}">
+                <a16:creationId xmlns:a16="http://schemas.microsoft.com/office/drawing/2014/main" id="{ECF30844-35E3-5F45-8895-7477CF74F573}"/>
+              </a:ext>
+            </a:extLst>
+          </p:cNvPr>
+          <p:cNvSpPr txBox="1"/>
+          <p:nvPr/>
+        </p:nvSpPr>
+        <p:spPr>
+          <a:xfrm>
+            <a:off x="2427340" y="3905698"/>
+            <a:ext cx="712054" cy="461665"/>
+          </a:xfrm>
+          <a:prstGeom prst="rect">
+            <a:avLst/>
+          </a:prstGeom>
+          <a:noFill/>
+        </p:spPr>
+        <p:txBody>
+          <a:bodyPr wrap="none" rtlCol="0">
+            <a:spAutoFit/>
+          </a:bodyPr>
+          <a:lstStyle/>
+          <a:p>
+            <a:r>
+              <a:rPr lang="en-US" sz="2400" dirty="0" err="1"/>
+              <a:t>scss</a:t>
+            </a:r>
+            <a:endParaRPr lang="en-US" sz="2400" dirty="0"/>
+          </a:p>
+        </p:txBody>
+      </p:sp>
+      <p:sp>
+        <p:nvSpPr>
+          <p:cNvPr id="7" name="TextBox 6">
+            <a:extLst>
+              <a:ext uri="{FF2B5EF4-FFF2-40B4-BE49-F238E27FC236}">
+                <a16:creationId xmlns:a16="http://schemas.microsoft.com/office/drawing/2014/main" id="{90FCB04B-38DC-2845-8B7A-715BB50A21A5}"/>
+              </a:ext>
+            </a:extLst>
+          </p:cNvPr>
+          <p:cNvSpPr txBox="1"/>
+          <p:nvPr/>
+        </p:nvSpPr>
+        <p:spPr>
+          <a:xfrm>
+            <a:off x="6865516" y="3905698"/>
+            <a:ext cx="587020" cy="461665"/>
+          </a:xfrm>
+          <a:prstGeom prst="rect">
+            <a:avLst/>
+          </a:prstGeom>
+          <a:noFill/>
+        </p:spPr>
+        <p:txBody>
+          <a:bodyPr wrap="none" rtlCol="0">
+            <a:spAutoFit/>
+          </a:bodyPr>
+          <a:lstStyle/>
+          <a:p>
+            <a:r>
+              <a:rPr lang="en-US" sz="2400" dirty="0" err="1"/>
+              <a:t>css</a:t>
+            </a:r>
+            <a:endParaRPr lang="en-US" sz="2400" dirty="0"/>
           </a:p>
         </p:txBody>
       </p:sp>
     </p:spTree>
     <p:extLst>
       <p:ext uri="{BB962C8B-B14F-4D97-AF65-F5344CB8AC3E}">
-        <p14:creationId xmlns:p14="http://schemas.microsoft.com/office/powerpoint/2010/main" val="1133438314"/>
+        <p14:creationId xmlns:p14="http://schemas.microsoft.com/office/powerpoint/2010/main" val="4049408383"/>
       </p:ext>
     </p:extLst>
   </p:cSld>
@@ -17494,6 +18339,925 @@
     <p:extLst>
       <p:ext uri="{BB962C8B-B14F-4D97-AF65-F5344CB8AC3E}">
         <p14:creationId xmlns:p14="http://schemas.microsoft.com/office/powerpoint/2010/main" val="2063707974"/>
+      </p:ext>
+    </p:extLst>
+  </p:cSld>
+  <p:clrMapOvr>
+    <a:masterClrMapping/>
+  </p:clrMapOvr>
+</p:sld>
+</file>
+
+<file path=ppt/slides/slide30.xml><?xml version="1.0" encoding="utf-8"?>
+<p:sld xmlns:a="http://schemas.openxmlformats.org/drawingml/2006/main" xmlns:r="http://schemas.openxmlformats.org/officeDocument/2006/relationships" xmlns:p="http://schemas.openxmlformats.org/presentationml/2006/main">
+  <p:cSld>
+    <p:spTree>
+      <p:nvGrpSpPr>
+        <p:cNvPr id="1" name=""/>
+        <p:cNvGrpSpPr/>
+        <p:nvPr/>
+      </p:nvGrpSpPr>
+      <p:grpSpPr>
+        <a:xfrm>
+          <a:off x="0" y="0"/>
+          <a:ext cx="0" cy="0"/>
+          <a:chOff x="0" y="0"/>
+          <a:chExt cx="0" cy="0"/>
+        </a:xfrm>
+      </p:grpSpPr>
+      <p:sp>
+        <p:nvSpPr>
+          <p:cNvPr id="2" name="Title 1">
+            <a:extLst>
+              <a:ext uri="{FF2B5EF4-FFF2-40B4-BE49-F238E27FC236}">
+                <a16:creationId xmlns:a16="http://schemas.microsoft.com/office/drawing/2014/main" id="{6EA8838F-1866-9145-909F-C4585DDF893E}"/>
+              </a:ext>
+            </a:extLst>
+          </p:cNvPr>
+          <p:cNvSpPr>
+            <a:spLocks noGrp="1"/>
+          </p:cNvSpPr>
+          <p:nvPr>
+            <p:ph type="title"/>
+          </p:nvPr>
+        </p:nvSpPr>
+        <p:spPr/>
+        <p:txBody>
+          <a:bodyPr/>
+          <a:lstStyle/>
+          <a:p>
+            <a:r>
+              <a:rPr lang="en-US" dirty="0" err="1"/>
+              <a:t>Unterschied</a:t>
+            </a:r>
+            <a:r>
+              <a:rPr lang="en-US" dirty="0"/>
+              <a:t>: </a:t>
+            </a:r>
+            <a:r>
+              <a:rPr lang="en-US" dirty="0" err="1"/>
+              <a:t>mixin</a:t>
+            </a:r>
+            <a:r>
+              <a:rPr lang="en-US" dirty="0"/>
+              <a:t> vs extend</a:t>
+            </a:r>
+          </a:p>
+        </p:txBody>
+      </p:sp>
+      <p:sp>
+        <p:nvSpPr>
+          <p:cNvPr id="3" name="Content Placeholder 2">
+            <a:extLst>
+              <a:ext uri="{FF2B5EF4-FFF2-40B4-BE49-F238E27FC236}">
+                <a16:creationId xmlns:a16="http://schemas.microsoft.com/office/drawing/2014/main" id="{EF188EBC-62F4-5D43-811D-6B1D2CA9C464}"/>
+              </a:ext>
+            </a:extLst>
+          </p:cNvPr>
+          <p:cNvSpPr>
+            <a:spLocks noGrp="1"/>
+          </p:cNvSpPr>
+          <p:nvPr>
+            <p:ph idx="1"/>
+          </p:nvPr>
+        </p:nvSpPr>
+        <p:spPr/>
+        <p:txBody>
+          <a:bodyPr/>
+          <a:lstStyle/>
+          <a:p>
+            <a:r>
+              <a:rPr lang="en-US" dirty="0"/>
+              <a:t>Bei extend </a:t>
+            </a:r>
+            <a:r>
+              <a:rPr lang="en-US" dirty="0" err="1"/>
+              <a:t>erzeugt</a:t>
+            </a:r>
+            <a:r>
+              <a:rPr lang="en-US" dirty="0"/>
+              <a:t> man </a:t>
+            </a:r>
+            <a:r>
+              <a:rPr lang="en-US" dirty="0" err="1"/>
+              <a:t>eine</a:t>
+            </a:r>
+            <a:r>
+              <a:rPr lang="en-US" dirty="0"/>
+              <a:t> (</a:t>
+            </a:r>
+            <a:r>
+              <a:rPr lang="en-US" dirty="0" err="1"/>
+              <a:t>vielleicht</a:t>
+            </a:r>
+            <a:r>
+              <a:rPr lang="en-US" dirty="0"/>
+              <a:t> </a:t>
+            </a:r>
+            <a:r>
+              <a:rPr lang="en-US" dirty="0" err="1"/>
+              <a:t>ungewollte</a:t>
+            </a:r>
+            <a:r>
+              <a:rPr lang="en-US" dirty="0"/>
+              <a:t>) </a:t>
+            </a:r>
+            <a:r>
+              <a:rPr lang="en-US" dirty="0" err="1"/>
+              <a:t>Verwandschaft</a:t>
+            </a:r>
+            <a:r>
+              <a:rPr lang="en-US" dirty="0"/>
+              <a:t> </a:t>
+            </a:r>
+            <a:r>
+              <a:rPr lang="en-US" dirty="0" err="1"/>
+              <a:t>zwischen</a:t>
+            </a:r>
+            <a:r>
+              <a:rPr lang="en-US" dirty="0"/>
+              <a:t> den </a:t>
+            </a:r>
+            <a:r>
+              <a:rPr lang="en-US" dirty="0" err="1"/>
+              <a:t>Elementen</a:t>
+            </a:r>
+            <a:r>
+              <a:rPr lang="en-US" dirty="0"/>
+              <a:t>. </a:t>
+            </a:r>
+            <a:br>
+              <a:rPr lang="en-US" dirty="0"/>
+            </a:br>
+            <a:r>
+              <a:rPr lang="en-US" dirty="0"/>
+              <a:t>-&gt; </a:t>
+            </a:r>
+            <a:r>
+              <a:rPr lang="en-US" dirty="0" err="1"/>
+              <a:t>somit</a:t>
+            </a:r>
+            <a:r>
+              <a:rPr lang="en-US" dirty="0"/>
+              <a:t> </a:t>
+            </a:r>
+            <a:r>
+              <a:rPr lang="en-US" dirty="0" err="1"/>
+              <a:t>spielt</a:t>
+            </a:r>
+            <a:r>
+              <a:rPr lang="en-US" dirty="0"/>
+              <a:t> </a:t>
+            </a:r>
+            <a:r>
+              <a:rPr lang="en-US" dirty="0" err="1"/>
+              <a:t>dann</a:t>
+            </a:r>
+            <a:r>
+              <a:rPr lang="en-US" dirty="0"/>
+              <a:t> die Position </a:t>
+            </a:r>
+            <a:r>
+              <a:rPr lang="en-US" dirty="0" err="1"/>
+              <a:t>im</a:t>
+            </a:r>
+            <a:r>
+              <a:rPr lang="en-US" dirty="0"/>
+              <a:t> Code </a:t>
+            </a:r>
+            <a:r>
+              <a:rPr lang="en-US" dirty="0" err="1"/>
+              <a:t>eine</a:t>
+            </a:r>
+            <a:r>
+              <a:rPr lang="en-US" dirty="0"/>
+              <a:t> Rolle </a:t>
+            </a:r>
+          </a:p>
+          <a:p>
+            <a:r>
+              <a:rPr lang="en-US" dirty="0"/>
+              <a:t>Bei </a:t>
+            </a:r>
+            <a:r>
+              <a:rPr lang="en-US" dirty="0" err="1"/>
+              <a:t>mixin</a:t>
+            </a:r>
+            <a:r>
+              <a:rPr lang="en-US" dirty="0"/>
+              <a:t> </a:t>
+            </a:r>
+            <a:r>
+              <a:rPr lang="en-US" dirty="0" err="1"/>
+              <a:t>bleiben</a:t>
+            </a:r>
+            <a:r>
+              <a:rPr lang="en-US" dirty="0"/>
+              <a:t> die </a:t>
+            </a:r>
+            <a:r>
+              <a:rPr lang="en-US" dirty="0" err="1"/>
+              <a:t>Elemente</a:t>
+            </a:r>
+            <a:r>
+              <a:rPr lang="en-US" dirty="0"/>
+              <a:t> </a:t>
+            </a:r>
+            <a:r>
+              <a:rPr lang="en-US" dirty="0" err="1"/>
+              <a:t>unabhängig</a:t>
+            </a:r>
+            <a:r>
+              <a:rPr lang="en-US" dirty="0"/>
+              <a:t>. </a:t>
+            </a:r>
+            <a:r>
+              <a:rPr lang="en-US" dirty="0" err="1"/>
+              <a:t>Dadurch</a:t>
+            </a:r>
+            <a:r>
+              <a:rPr lang="en-US" dirty="0"/>
+              <a:t> </a:t>
+            </a:r>
+            <a:r>
+              <a:rPr lang="en-US" dirty="0" err="1"/>
+              <a:t>wird</a:t>
+            </a:r>
+            <a:r>
+              <a:rPr lang="en-US" dirty="0"/>
+              <a:t> </a:t>
+            </a:r>
+            <a:r>
+              <a:rPr lang="en-US" dirty="0" err="1"/>
+              <a:t>ev</a:t>
+            </a:r>
+            <a:r>
+              <a:rPr lang="en-US" dirty="0"/>
+              <a:t>. </a:t>
+            </a:r>
+            <a:r>
+              <a:rPr lang="en-US" dirty="0" err="1"/>
+              <a:t>dass</a:t>
+            </a:r>
+            <a:r>
+              <a:rPr lang="en-US" dirty="0"/>
+              <a:t> </a:t>
+            </a:r>
+            <a:r>
+              <a:rPr lang="en-US" dirty="0" err="1"/>
+              <a:t>css</a:t>
+            </a:r>
+            <a:r>
+              <a:rPr lang="en-US" dirty="0"/>
+              <a:t> </a:t>
+            </a:r>
+            <a:r>
+              <a:rPr lang="en-US" dirty="0" err="1"/>
+              <a:t>grösster</a:t>
+            </a:r>
+            <a:r>
+              <a:rPr lang="en-US" dirty="0"/>
+              <a:t>.</a:t>
+            </a:r>
+          </a:p>
+          <a:p>
+            <a:r>
+              <a:rPr lang="en-US" dirty="0" err="1"/>
+              <a:t>Kritischer</a:t>
+            </a:r>
+            <a:r>
+              <a:rPr lang="en-US" dirty="0"/>
+              <a:t> </a:t>
+            </a:r>
+            <a:r>
+              <a:rPr lang="en-US" dirty="0" err="1"/>
+              <a:t>Artikel</a:t>
+            </a:r>
+            <a:r>
+              <a:rPr lang="en-US" dirty="0"/>
+              <a:t> </a:t>
+            </a:r>
+            <a:r>
+              <a:rPr lang="en-US" dirty="0" err="1"/>
+              <a:t>zu</a:t>
+            </a:r>
+            <a:r>
+              <a:rPr lang="en-US" dirty="0"/>
+              <a:t> extend vs </a:t>
+            </a:r>
+            <a:r>
+              <a:rPr lang="en-US" dirty="0" err="1"/>
+              <a:t>mixin</a:t>
+            </a:r>
+            <a:br>
+              <a:rPr lang="en-US" dirty="0"/>
+            </a:br>
+            <a:r>
+              <a:rPr lang="en-US" dirty="0">
+                <a:hlinkClick r:id="rId2"/>
+              </a:rPr>
+              <a:t>https://csswizardry.com/2014/11/when-to-use-extend-when-to-use-a-mixin/</a:t>
+            </a:r>
+            <a:endParaRPr lang="en-US" dirty="0"/>
+          </a:p>
+          <a:p>
+            <a:endParaRPr lang="en-US" dirty="0"/>
+          </a:p>
+        </p:txBody>
+      </p:sp>
+    </p:spTree>
+    <p:extLst>
+      <p:ext uri="{BB962C8B-B14F-4D97-AF65-F5344CB8AC3E}">
+        <p14:creationId xmlns:p14="http://schemas.microsoft.com/office/powerpoint/2010/main" val="1890938826"/>
+      </p:ext>
+    </p:extLst>
+  </p:cSld>
+  <p:clrMapOvr>
+    <a:masterClrMapping/>
+  </p:clrMapOvr>
+</p:sld>
+</file>
+
+<file path=ppt/slides/slide31.xml><?xml version="1.0" encoding="utf-8"?>
+<p:sld xmlns:a="http://schemas.openxmlformats.org/drawingml/2006/main" xmlns:r="http://schemas.openxmlformats.org/officeDocument/2006/relationships" xmlns:p="http://schemas.openxmlformats.org/presentationml/2006/main">
+  <p:cSld>
+    <p:spTree>
+      <p:nvGrpSpPr>
+        <p:cNvPr id="1" name=""/>
+        <p:cNvGrpSpPr/>
+        <p:nvPr/>
+      </p:nvGrpSpPr>
+      <p:grpSpPr>
+        <a:xfrm>
+          <a:off x="0" y="0"/>
+          <a:ext cx="0" cy="0"/>
+          <a:chOff x="0" y="0"/>
+          <a:chExt cx="0" cy="0"/>
+        </a:xfrm>
+      </p:grpSpPr>
+      <p:sp>
+        <p:nvSpPr>
+          <p:cNvPr id="2" name="Titel 1">
+            <a:extLst>
+              <a:ext uri="{FF2B5EF4-FFF2-40B4-BE49-F238E27FC236}">
+                <a16:creationId xmlns:a16="http://schemas.microsoft.com/office/drawing/2014/main" id="{A42CADB6-47CF-834F-B99E-514CE154341D}"/>
+              </a:ext>
+            </a:extLst>
+          </p:cNvPr>
+          <p:cNvSpPr>
+            <a:spLocks noGrp="1"/>
+          </p:cNvSpPr>
+          <p:nvPr>
+            <p:ph type="title"/>
+          </p:nvPr>
+        </p:nvSpPr>
+        <p:spPr/>
+        <p:txBody>
+          <a:bodyPr/>
+          <a:lstStyle/>
+          <a:p>
+            <a:r>
+              <a:rPr lang="de-DE" dirty="0"/>
+              <a:t>Übung</a:t>
+            </a:r>
+          </a:p>
+        </p:txBody>
+      </p:sp>
+      <p:sp>
+        <p:nvSpPr>
+          <p:cNvPr id="3" name="Inhaltsplatzhalter 2">
+            <a:extLst>
+              <a:ext uri="{FF2B5EF4-FFF2-40B4-BE49-F238E27FC236}">
+                <a16:creationId xmlns:a16="http://schemas.microsoft.com/office/drawing/2014/main" id="{1DE8F02E-B6C9-F74E-BB62-836EFCBE257B}"/>
+              </a:ext>
+            </a:extLst>
+          </p:cNvPr>
+          <p:cNvSpPr>
+            <a:spLocks noGrp="1"/>
+          </p:cNvSpPr>
+          <p:nvPr>
+            <p:ph idx="1"/>
+          </p:nvPr>
+        </p:nvSpPr>
+        <p:spPr/>
+        <p:txBody>
+          <a:bodyPr/>
+          <a:lstStyle/>
+          <a:p>
+            <a:r>
+              <a:rPr lang="de-CH" dirty="0"/>
+              <a:t>Lese dich in das Erstellen von Dreiecken mit CSS ein </a:t>
+            </a:r>
+            <a:br>
+              <a:rPr lang="de-CH" dirty="0"/>
+            </a:br>
+            <a:r>
+              <a:rPr lang="de-CH" dirty="0">
+                <a:hlinkClick r:id="rId2"/>
+              </a:rPr>
+              <a:t>https://css-tricks.com/snippets/css/css-triangle</a:t>
+            </a:r>
+            <a:endParaRPr lang="de-CH" dirty="0"/>
+          </a:p>
+          <a:p>
+            <a:r>
+              <a:rPr lang="de-CH" dirty="0"/>
+              <a:t>Entwickle ein </a:t>
+            </a:r>
+            <a:r>
+              <a:rPr lang="de-CH" dirty="0" err="1"/>
+              <a:t>Mixin</a:t>
+            </a:r>
+            <a:r>
+              <a:rPr lang="de-CH" dirty="0"/>
+              <a:t>, mit welchem du Pfeile in allen </a:t>
+            </a:r>
+            <a:r>
+              <a:rPr lang="de-CH" dirty="0" err="1"/>
+              <a:t>Grössen</a:t>
+            </a:r>
+            <a:r>
+              <a:rPr lang="de-CH" dirty="0"/>
+              <a:t>, Farben und Richtungen erstellen kannst. </a:t>
+            </a:r>
+          </a:p>
+          <a:p>
+            <a:r>
+              <a:rPr lang="de-CH" dirty="0"/>
+              <a:t>Der Aufruf sollte dann etwa so aussehen: </a:t>
+            </a:r>
+          </a:p>
+          <a:p>
+            <a:endParaRPr lang="de-CH" dirty="0"/>
+          </a:p>
+          <a:p>
+            <a:endParaRPr lang="de-DE" dirty="0"/>
+          </a:p>
+        </p:txBody>
+      </p:sp>
+      <p:sp>
+        <p:nvSpPr>
+          <p:cNvPr id="4" name="Rechteck 11">
+            <a:extLst>
+              <a:ext uri="{FF2B5EF4-FFF2-40B4-BE49-F238E27FC236}">
+                <a16:creationId xmlns:a16="http://schemas.microsoft.com/office/drawing/2014/main" id="{1533C61C-E9FA-294B-A899-8F5B98AEAF30}"/>
+              </a:ext>
+            </a:extLst>
+          </p:cNvPr>
+          <p:cNvSpPr txBox="1">
+            <a:spLocks/>
+          </p:cNvSpPr>
+          <p:nvPr/>
+        </p:nvSpPr>
+        <p:spPr>
+          <a:xfrm>
+            <a:off x="2444394" y="4646145"/>
+            <a:ext cx="5138436" cy="1096734"/>
+          </a:xfrm>
+          <a:prstGeom prst="rect">
+            <a:avLst/>
+          </a:prstGeom>
+        </p:spPr>
+        <p:style>
+          <a:lnRef idx="2">
+            <a:schemeClr val="accent6"/>
+          </a:lnRef>
+          <a:fillRef idx="1">
+            <a:schemeClr val="lt1"/>
+          </a:fillRef>
+          <a:effectRef idx="0">
+            <a:schemeClr val="accent6"/>
+          </a:effectRef>
+          <a:fontRef idx="minor">
+            <a:schemeClr val="dk1"/>
+          </a:fontRef>
+        </p:style>
+        <p:txBody>
+          <a:bodyPr vert="horz" lIns="91440" tIns="45720" rIns="91440" bIns="45720" rtlCol="0" anchor="t">
+            <a:noAutofit/>
+          </a:bodyPr>
+          <a:lstStyle>
+            <a:lvl1pPr marL="228600" indent="-228600" algn="l" defTabSz="914400" rtl="0" eaLnBrk="1" latinLnBrk="0" hangingPunct="1">
+              <a:lnSpc>
+                <a:spcPct val="90000"/>
+              </a:lnSpc>
+              <a:spcBef>
+                <a:spcPts val="1000"/>
+              </a:spcBef>
+              <a:buFont typeface="Arial" panose="020B0604020202020204" pitchFamily="34" charset="0"/>
+              <a:buChar char="•"/>
+              <a:defRPr sz="2400" kern="1200">
+                <a:solidFill>
+                  <a:schemeClr val="dk1"/>
+                </a:solidFill>
+                <a:latin typeface="+mn-lt"/>
+                <a:ea typeface="+mn-ea"/>
+                <a:cs typeface="+mn-cs"/>
+              </a:defRPr>
+            </a:lvl1pPr>
+            <a:lvl2pPr marL="685800" indent="-228600" algn="l" defTabSz="914400" rtl="0" eaLnBrk="1" latinLnBrk="0" hangingPunct="1">
+              <a:lnSpc>
+                <a:spcPct val="90000"/>
+              </a:lnSpc>
+              <a:spcBef>
+                <a:spcPts val="500"/>
+              </a:spcBef>
+              <a:buFont typeface="Arial" panose="020B0604020202020204" pitchFamily="34" charset="0"/>
+              <a:buChar char="•"/>
+              <a:defRPr sz="2000" kern="1200">
+                <a:solidFill>
+                  <a:schemeClr val="dk1"/>
+                </a:solidFill>
+                <a:latin typeface="+mn-lt"/>
+                <a:ea typeface="+mn-ea"/>
+                <a:cs typeface="+mn-cs"/>
+              </a:defRPr>
+            </a:lvl2pPr>
+            <a:lvl3pPr marL="1143000" indent="-228600" algn="l" defTabSz="914400" rtl="0" eaLnBrk="1" latinLnBrk="0" hangingPunct="1">
+              <a:lnSpc>
+                <a:spcPct val="90000"/>
+              </a:lnSpc>
+              <a:spcBef>
+                <a:spcPts val="500"/>
+              </a:spcBef>
+              <a:buFont typeface="Arial" panose="020B0604020202020204" pitchFamily="34" charset="0"/>
+              <a:buChar char="•"/>
+              <a:defRPr sz="1800" kern="1200">
+                <a:solidFill>
+                  <a:schemeClr val="dk1"/>
+                </a:solidFill>
+                <a:latin typeface="+mn-lt"/>
+                <a:ea typeface="+mn-ea"/>
+                <a:cs typeface="+mn-cs"/>
+              </a:defRPr>
+            </a:lvl3pPr>
+            <a:lvl4pPr marL="1600200" indent="-228600" algn="l" defTabSz="914400" rtl="0" eaLnBrk="1" latinLnBrk="0" hangingPunct="1">
+              <a:lnSpc>
+                <a:spcPct val="90000"/>
+              </a:lnSpc>
+              <a:spcBef>
+                <a:spcPts val="500"/>
+              </a:spcBef>
+              <a:buFont typeface="Arial" panose="020B0604020202020204" pitchFamily="34" charset="0"/>
+              <a:buChar char="•"/>
+              <a:defRPr sz="1600" kern="1200">
+                <a:solidFill>
+                  <a:schemeClr val="dk1"/>
+                </a:solidFill>
+                <a:latin typeface="+mn-lt"/>
+                <a:ea typeface="+mn-ea"/>
+                <a:cs typeface="+mn-cs"/>
+              </a:defRPr>
+            </a:lvl4pPr>
+            <a:lvl5pPr marL="2057400" indent="-228600" algn="l" defTabSz="914400" rtl="0" eaLnBrk="1" latinLnBrk="0" hangingPunct="1">
+              <a:lnSpc>
+                <a:spcPct val="90000"/>
+              </a:lnSpc>
+              <a:spcBef>
+                <a:spcPts val="500"/>
+              </a:spcBef>
+              <a:buFont typeface="Arial" panose="020B0604020202020204" pitchFamily="34" charset="0"/>
+              <a:buChar char="•"/>
+              <a:defRPr sz="1600" kern="1200">
+                <a:solidFill>
+                  <a:schemeClr val="dk1"/>
+                </a:solidFill>
+                <a:latin typeface="+mn-lt"/>
+                <a:ea typeface="+mn-ea"/>
+                <a:cs typeface="+mn-cs"/>
+              </a:defRPr>
+            </a:lvl5pPr>
+            <a:lvl6pPr marL="2514600" indent="-228600" algn="l" defTabSz="914400" rtl="0" eaLnBrk="1" latinLnBrk="0" hangingPunct="1">
+              <a:lnSpc>
+                <a:spcPct val="90000"/>
+              </a:lnSpc>
+              <a:spcBef>
+                <a:spcPts val="500"/>
+              </a:spcBef>
+              <a:buFont typeface="Arial" panose="020B0604020202020204" pitchFamily="34" charset="0"/>
+              <a:buChar char="•"/>
+              <a:defRPr sz="1400" kern="1200">
+                <a:solidFill>
+                  <a:schemeClr val="dk1"/>
+                </a:solidFill>
+                <a:latin typeface="+mn-lt"/>
+                <a:ea typeface="+mn-ea"/>
+                <a:cs typeface="+mn-cs"/>
+              </a:defRPr>
+            </a:lvl6pPr>
+            <a:lvl7pPr marL="2971800" indent="-228600" algn="l" defTabSz="914400" rtl="0" eaLnBrk="1" latinLnBrk="0" hangingPunct="1">
+              <a:lnSpc>
+                <a:spcPct val="90000"/>
+              </a:lnSpc>
+              <a:spcBef>
+                <a:spcPts val="500"/>
+              </a:spcBef>
+              <a:buFont typeface="Arial" panose="020B0604020202020204" pitchFamily="34" charset="0"/>
+              <a:buChar char="•"/>
+              <a:defRPr sz="1400" kern="1200">
+                <a:solidFill>
+                  <a:schemeClr val="dk1"/>
+                </a:solidFill>
+                <a:latin typeface="+mn-lt"/>
+                <a:ea typeface="+mn-ea"/>
+                <a:cs typeface="+mn-cs"/>
+              </a:defRPr>
+            </a:lvl7pPr>
+            <a:lvl8pPr marL="3429000" indent="-228600" algn="l" defTabSz="914400" rtl="0" eaLnBrk="1" latinLnBrk="0" hangingPunct="1">
+              <a:lnSpc>
+                <a:spcPct val="90000"/>
+              </a:lnSpc>
+              <a:spcBef>
+                <a:spcPts val="500"/>
+              </a:spcBef>
+              <a:buFont typeface="Arial" panose="020B0604020202020204" pitchFamily="34" charset="0"/>
+              <a:buChar char="•"/>
+              <a:defRPr sz="1400" kern="1200">
+                <a:solidFill>
+                  <a:schemeClr val="dk1"/>
+                </a:solidFill>
+                <a:latin typeface="+mn-lt"/>
+                <a:ea typeface="+mn-ea"/>
+                <a:cs typeface="+mn-cs"/>
+              </a:defRPr>
+            </a:lvl8pPr>
+            <a:lvl9pPr marL="3886200" indent="-228600" algn="l" defTabSz="914400" rtl="0" eaLnBrk="1" latinLnBrk="0" hangingPunct="1">
+              <a:lnSpc>
+                <a:spcPct val="90000"/>
+              </a:lnSpc>
+              <a:spcBef>
+                <a:spcPts val="500"/>
+              </a:spcBef>
+              <a:buFont typeface="Arial" panose="020B0604020202020204" pitchFamily="34" charset="0"/>
+              <a:buChar char="•"/>
+              <a:defRPr sz="1400" kern="1200">
+                <a:solidFill>
+                  <a:schemeClr val="dk1"/>
+                </a:solidFill>
+                <a:latin typeface="+mn-lt"/>
+                <a:ea typeface="+mn-ea"/>
+                <a:cs typeface="+mn-cs"/>
+              </a:defRPr>
+            </a:lvl9pPr>
+          </a:lstStyle>
+          <a:p>
+            <a:pPr marL="0" indent="0">
+              <a:buNone/>
+            </a:pPr>
+            <a:r>
+              <a:rPr lang="de-CH" sz="1800" dirty="0">
+                <a:latin typeface="Arial" panose="020B0604020202020204" pitchFamily="34" charset="0"/>
+                <a:cs typeface="Arial" panose="020B0604020202020204" pitchFamily="34" charset="0"/>
+              </a:rPr>
+              <a:t>.</a:t>
+            </a:r>
+            <a:r>
+              <a:rPr lang="de-CH" sz="1800" dirty="0" err="1">
+                <a:latin typeface="Arial" panose="020B0604020202020204" pitchFamily="34" charset="0"/>
+                <a:cs typeface="Arial" panose="020B0604020202020204" pitchFamily="34" charset="0"/>
+              </a:rPr>
+              <a:t>awesome-triangle</a:t>
+            </a:r>
+            <a:r>
+              <a:rPr lang="de-CH" sz="1800" dirty="0">
+                <a:latin typeface="Arial" panose="020B0604020202020204" pitchFamily="34" charset="0"/>
+                <a:cs typeface="Arial" panose="020B0604020202020204" pitchFamily="34" charset="0"/>
+              </a:rPr>
+              <a:t> { @</a:t>
+            </a:r>
+            <a:r>
+              <a:rPr lang="de-CH" sz="1800" dirty="0" err="1">
+                <a:latin typeface="Arial" panose="020B0604020202020204" pitchFamily="34" charset="0"/>
+                <a:cs typeface="Arial" panose="020B0604020202020204" pitchFamily="34" charset="0"/>
+              </a:rPr>
+              <a:t>include</a:t>
+            </a:r>
+            <a:r>
+              <a:rPr lang="de-CH" sz="1800" dirty="0">
+                <a:latin typeface="Arial" panose="020B0604020202020204" pitchFamily="34" charset="0"/>
+                <a:cs typeface="Arial" panose="020B0604020202020204" pitchFamily="34" charset="0"/>
+              </a:rPr>
+              <a:t> </a:t>
+            </a:r>
+            <a:r>
+              <a:rPr lang="de-CH" sz="1800" dirty="0" err="1">
+                <a:latin typeface="Arial" panose="020B0604020202020204" pitchFamily="34" charset="0"/>
+                <a:cs typeface="Arial" panose="020B0604020202020204" pitchFamily="34" charset="0"/>
+              </a:rPr>
+              <a:t>triangle</a:t>
+            </a:r>
+            <a:r>
+              <a:rPr lang="de-CH" sz="1800" dirty="0">
+                <a:latin typeface="Arial" panose="020B0604020202020204" pitchFamily="34" charset="0"/>
+                <a:cs typeface="Arial" panose="020B0604020202020204" pitchFamily="34" charset="0"/>
+              </a:rPr>
+              <a:t>(top, </a:t>
+            </a:r>
+            <a:r>
+              <a:rPr lang="de-CH" sz="1800" dirty="0" err="1">
+                <a:latin typeface="Arial" panose="020B0604020202020204" pitchFamily="34" charset="0"/>
+                <a:cs typeface="Arial" panose="020B0604020202020204" pitchFamily="34" charset="0"/>
+              </a:rPr>
+              <a:t>green</a:t>
+            </a:r>
+            <a:r>
+              <a:rPr lang="de-CH" sz="1800" dirty="0">
+                <a:latin typeface="Arial" panose="020B0604020202020204" pitchFamily="34" charset="0"/>
+                <a:cs typeface="Arial" panose="020B0604020202020204" pitchFamily="34" charset="0"/>
+              </a:rPr>
+              <a:t>, 10px); } </a:t>
+            </a:r>
+            <a:endParaRPr lang="de-CH" sz="1800" dirty="0">
+              <a:effectLst/>
+              <a:latin typeface="Arial" panose="020B0604020202020204" pitchFamily="34" charset="0"/>
+              <a:cs typeface="Arial" panose="020B0604020202020204" pitchFamily="34" charset="0"/>
+            </a:endParaRPr>
+          </a:p>
+        </p:txBody>
+      </p:sp>
+    </p:spTree>
+    <p:extLst>
+      <p:ext uri="{BB962C8B-B14F-4D97-AF65-F5344CB8AC3E}">
+        <p14:creationId xmlns:p14="http://schemas.microsoft.com/office/powerpoint/2010/main" val="3326237602"/>
+      </p:ext>
+    </p:extLst>
+  </p:cSld>
+  <p:clrMapOvr>
+    <a:masterClrMapping/>
+  </p:clrMapOvr>
+</p:sld>
+</file>
+
+<file path=ppt/slides/slide32.xml><?xml version="1.0" encoding="utf-8"?>
+<p:sld xmlns:a="http://schemas.openxmlformats.org/drawingml/2006/main" xmlns:r="http://schemas.openxmlformats.org/officeDocument/2006/relationships" xmlns:p="http://schemas.openxmlformats.org/presentationml/2006/main">
+  <p:cSld>
+    <p:spTree>
+      <p:nvGrpSpPr>
+        <p:cNvPr id="1" name=""/>
+        <p:cNvGrpSpPr/>
+        <p:nvPr/>
+      </p:nvGrpSpPr>
+      <p:grpSpPr>
+        <a:xfrm>
+          <a:off x="0" y="0"/>
+          <a:ext cx="0" cy="0"/>
+          <a:chOff x="0" y="0"/>
+          <a:chExt cx="0" cy="0"/>
+        </a:xfrm>
+      </p:grpSpPr>
+      <p:sp>
+        <p:nvSpPr>
+          <p:cNvPr id="2" name="Titel 1">
+            <a:extLst>
+              <a:ext uri="{FF2B5EF4-FFF2-40B4-BE49-F238E27FC236}">
+                <a16:creationId xmlns:a16="http://schemas.microsoft.com/office/drawing/2014/main" id="{AC67C0CD-BDC0-0242-BD00-AAE34498B0BF}"/>
+              </a:ext>
+            </a:extLst>
+          </p:cNvPr>
+          <p:cNvSpPr>
+            <a:spLocks noGrp="1"/>
+          </p:cNvSpPr>
+          <p:nvPr>
+            <p:ph type="title"/>
+          </p:nvPr>
+        </p:nvSpPr>
+        <p:spPr/>
+        <p:txBody>
+          <a:bodyPr/>
+          <a:lstStyle/>
+          <a:p>
+            <a:endParaRPr lang="de-DE"/>
+          </a:p>
+        </p:txBody>
+      </p:sp>
+      <p:sp>
+        <p:nvSpPr>
+          <p:cNvPr id="3" name="Inhaltsplatzhalter 2">
+            <a:extLst>
+              <a:ext uri="{FF2B5EF4-FFF2-40B4-BE49-F238E27FC236}">
+                <a16:creationId xmlns:a16="http://schemas.microsoft.com/office/drawing/2014/main" id="{3C464ED7-5F60-6A42-A98C-D08D5C1223B0}"/>
+              </a:ext>
+            </a:extLst>
+          </p:cNvPr>
+          <p:cNvSpPr>
+            <a:spLocks noGrp="1"/>
+          </p:cNvSpPr>
+          <p:nvPr>
+            <p:ph idx="1"/>
+          </p:nvPr>
+        </p:nvSpPr>
+        <p:spPr/>
+        <p:txBody>
+          <a:bodyPr/>
+          <a:lstStyle/>
+          <a:p>
+            <a:endParaRPr lang="de-DE"/>
+          </a:p>
+        </p:txBody>
+      </p:sp>
+    </p:spTree>
+    <p:extLst>
+      <p:ext uri="{BB962C8B-B14F-4D97-AF65-F5344CB8AC3E}">
+        <p14:creationId xmlns:p14="http://schemas.microsoft.com/office/powerpoint/2010/main" val="3081746191"/>
+      </p:ext>
+    </p:extLst>
+  </p:cSld>
+  <p:clrMapOvr>
+    <a:masterClrMapping/>
+  </p:clrMapOvr>
+</p:sld>
+</file>
+
+<file path=ppt/slides/slide33.xml><?xml version="1.0" encoding="utf-8"?>
+<p:sld xmlns:a="http://schemas.openxmlformats.org/drawingml/2006/main" xmlns:r="http://schemas.openxmlformats.org/officeDocument/2006/relationships" xmlns:p="http://schemas.openxmlformats.org/presentationml/2006/main">
+  <p:cSld>
+    <p:spTree>
+      <p:nvGrpSpPr>
+        <p:cNvPr id="1" name=""/>
+        <p:cNvGrpSpPr/>
+        <p:nvPr/>
+      </p:nvGrpSpPr>
+      <p:grpSpPr>
+        <a:xfrm>
+          <a:off x="0" y="0"/>
+          <a:ext cx="0" cy="0"/>
+          <a:chOff x="0" y="0"/>
+          <a:chExt cx="0" cy="0"/>
+        </a:xfrm>
+      </p:grpSpPr>
+      <p:sp>
+        <p:nvSpPr>
+          <p:cNvPr id="2" name="Title 1">
+            <a:extLst>
+              <a:ext uri="{FF2B5EF4-FFF2-40B4-BE49-F238E27FC236}">
+                <a16:creationId xmlns:a16="http://schemas.microsoft.com/office/drawing/2014/main" id="{BC526089-5BAD-E24F-9FA8-D57E3125952F}"/>
+              </a:ext>
+            </a:extLst>
+          </p:cNvPr>
+          <p:cNvSpPr>
+            <a:spLocks noGrp="1"/>
+          </p:cNvSpPr>
+          <p:nvPr>
+            <p:ph type="title"/>
+          </p:nvPr>
+        </p:nvSpPr>
+        <p:spPr/>
+        <p:txBody>
+          <a:bodyPr/>
+          <a:lstStyle/>
+          <a:p>
+            <a:r>
+              <a:rPr lang="de-DE" dirty="0"/>
+              <a:t>Literatur / Tutorials</a:t>
+            </a:r>
+            <a:endParaRPr lang="en-US" dirty="0"/>
+          </a:p>
+        </p:txBody>
+      </p:sp>
+      <p:sp>
+        <p:nvSpPr>
+          <p:cNvPr id="3" name="Content Placeholder 2">
+            <a:extLst>
+              <a:ext uri="{FF2B5EF4-FFF2-40B4-BE49-F238E27FC236}">
+                <a16:creationId xmlns:a16="http://schemas.microsoft.com/office/drawing/2014/main" id="{A8289C28-27A5-2940-AB9F-CC7584E8F117}"/>
+              </a:ext>
+            </a:extLst>
+          </p:cNvPr>
+          <p:cNvSpPr>
+            <a:spLocks noGrp="1"/>
+          </p:cNvSpPr>
+          <p:nvPr>
+            <p:ph idx="1"/>
+          </p:nvPr>
+        </p:nvSpPr>
+        <p:spPr/>
+        <p:txBody>
+          <a:bodyPr/>
+          <a:lstStyle/>
+          <a:p>
+            <a:r>
+              <a:rPr lang="en-US" dirty="0">
+                <a:hlinkClick r:id="rId2"/>
+              </a:rPr>
+              <a:t>https://www.sassmeister.com/</a:t>
+            </a:r>
+            <a:endParaRPr lang="en-US" dirty="0"/>
+          </a:p>
+          <a:p>
+            <a:r>
+              <a:rPr lang="en-US" dirty="0">
+                <a:hlinkClick r:id="rId3"/>
+              </a:rPr>
+              <a:t>https://tutorialzine.com/2016/01/learn-sass-in-15-minutes</a:t>
+            </a:r>
+            <a:endParaRPr lang="en-US" dirty="0"/>
+          </a:p>
+        </p:txBody>
+      </p:sp>
+    </p:spTree>
+    <p:extLst>
+      <p:ext uri="{BB962C8B-B14F-4D97-AF65-F5344CB8AC3E}">
+        <p14:creationId xmlns:p14="http://schemas.microsoft.com/office/powerpoint/2010/main" val="1133438314"/>
       </p:ext>
     </p:extLst>
   </p:cSld>

</xml_diff>

<commit_message>
Übung zu html Dreiecken mit mixins erstellt.
</commit_message>
<xml_diff>
--- a/sassSchulung.pptx
+++ b/sassSchulung.pptx
@@ -18811,8 +18811,8 @@
         </p:nvSpPr>
         <p:spPr>
           <a:xfrm>
-            <a:off x="2444394" y="4646145"/>
-            <a:ext cx="5138436" cy="1096734"/>
+            <a:off x="2918033" y="4690750"/>
+            <a:ext cx="5138436" cy="1040977"/>
           </a:xfrm>
           <a:prstGeom prst="rect">
             <a:avLst/>
@@ -19023,7 +19023,20 @@
                 <a:latin typeface="Arial" panose="020B0604020202020204" pitchFamily="34" charset="0"/>
                 <a:cs typeface="Arial" panose="020B0604020202020204" pitchFamily="34" charset="0"/>
               </a:rPr>
-              <a:t> { @</a:t>
+              <a:t> { </a:t>
+            </a:r>
+            <a:br>
+              <a:rPr lang="de-CH" sz="1800" dirty="0">
+                <a:latin typeface="Arial" panose="020B0604020202020204" pitchFamily="34" charset="0"/>
+                <a:cs typeface="Arial" panose="020B0604020202020204" pitchFamily="34" charset="0"/>
+              </a:rPr>
+            </a:br>
+            <a:r>
+              <a:rPr lang="de-CH" sz="1800" dirty="0">
+                <a:latin typeface="Arial" panose="020B0604020202020204" pitchFamily="34" charset="0"/>
+                <a:cs typeface="Arial" panose="020B0604020202020204" pitchFamily="34" charset="0"/>
+              </a:rPr>
+              <a:t>    @</a:t>
             </a:r>
             <a:r>
               <a:rPr lang="de-CH" sz="1800" dirty="0" err="1">
@@ -19065,7 +19078,20 @@
                 <a:latin typeface="Arial" panose="020B0604020202020204" pitchFamily="34" charset="0"/>
                 <a:cs typeface="Arial" panose="020B0604020202020204" pitchFamily="34" charset="0"/>
               </a:rPr>
-              <a:t>, 10px); } </a:t>
+              <a:t>, 10px); </a:t>
+            </a:r>
+            <a:br>
+              <a:rPr lang="de-CH" sz="1800" dirty="0">
+                <a:latin typeface="Arial" panose="020B0604020202020204" pitchFamily="34" charset="0"/>
+                <a:cs typeface="Arial" panose="020B0604020202020204" pitchFamily="34" charset="0"/>
+              </a:rPr>
+            </a:br>
+            <a:r>
+              <a:rPr lang="de-CH" sz="1800" dirty="0">
+                <a:latin typeface="Arial" panose="020B0604020202020204" pitchFamily="34" charset="0"/>
+                <a:cs typeface="Arial" panose="020B0604020202020204" pitchFamily="34" charset="0"/>
+              </a:rPr>
+              <a:t>} </a:t>
             </a:r>
             <a:endParaRPr lang="de-CH" sz="1800" dirty="0">
               <a:effectLst/>

</xml_diff>

<commit_message>
kl Anpassung sass PP Präsentation
</commit_message>
<xml_diff>
--- a/sassSchulung.pptx
+++ b/sassSchulung.pptx
@@ -35,9 +35,10 @@
     <p:sldId id="284" r:id="rId29"/>
     <p:sldId id="287" r:id="rId30"/>
     <p:sldId id="285" r:id="rId31"/>
-    <p:sldId id="288" r:id="rId32"/>
-    <p:sldId id="289" r:id="rId33"/>
-    <p:sldId id="277" r:id="rId34"/>
+    <p:sldId id="290" r:id="rId32"/>
+    <p:sldId id="288" r:id="rId33"/>
+    <p:sldId id="289" r:id="rId34"/>
+    <p:sldId id="277" r:id="rId35"/>
   </p:sldIdLst>
   <p:sldSz cx="12192000" cy="6858000"/>
   <p:notesSz cx="6858000" cy="9144000"/>
@@ -18700,6 +18701,89 @@
           <p:cNvPr id="2" name="Titel 1">
             <a:extLst>
               <a:ext uri="{FF2B5EF4-FFF2-40B4-BE49-F238E27FC236}">
+                <a16:creationId xmlns:a16="http://schemas.microsoft.com/office/drawing/2014/main" id="{F384741F-8E63-A04B-98FB-7249E8A872E3}"/>
+              </a:ext>
+            </a:extLst>
+          </p:cNvPr>
+          <p:cNvSpPr>
+            <a:spLocks noGrp="1"/>
+          </p:cNvSpPr>
+          <p:nvPr>
+            <p:ph type="title"/>
+          </p:nvPr>
+        </p:nvSpPr>
+        <p:spPr/>
+        <p:txBody>
+          <a:bodyPr/>
+          <a:lstStyle/>
+          <a:p>
+            <a:r>
+              <a:rPr lang="de-DE" dirty="0"/>
+              <a:t>Übung</a:t>
+            </a:r>
+          </a:p>
+        </p:txBody>
+      </p:sp>
+      <p:sp>
+        <p:nvSpPr>
+          <p:cNvPr id="3" name="Inhaltsplatzhalter 2">
+            <a:extLst>
+              <a:ext uri="{FF2B5EF4-FFF2-40B4-BE49-F238E27FC236}">
+                <a16:creationId xmlns:a16="http://schemas.microsoft.com/office/drawing/2014/main" id="{A9B57DFA-0BEE-9648-BC28-9B68CF66BF35}"/>
+              </a:ext>
+            </a:extLst>
+          </p:cNvPr>
+          <p:cNvSpPr>
+            <a:spLocks noGrp="1"/>
+          </p:cNvSpPr>
+          <p:nvPr>
+            <p:ph idx="1"/>
+          </p:nvPr>
+        </p:nvSpPr>
+        <p:spPr/>
+        <p:txBody>
+          <a:bodyPr/>
+          <a:lstStyle/>
+          <a:p>
+            <a:endParaRPr lang="de-DE"/>
+          </a:p>
+        </p:txBody>
+      </p:sp>
+    </p:spTree>
+    <p:extLst>
+      <p:ext uri="{BB962C8B-B14F-4D97-AF65-F5344CB8AC3E}">
+        <p14:creationId xmlns:p14="http://schemas.microsoft.com/office/powerpoint/2010/main" val="2187394237"/>
+      </p:ext>
+    </p:extLst>
+  </p:cSld>
+  <p:clrMapOvr>
+    <a:masterClrMapping/>
+  </p:clrMapOvr>
+</p:sld>
+</file>
+
+<file path=ppt/slides/slide32.xml><?xml version="1.0" encoding="utf-8"?>
+<p:sld xmlns:a="http://schemas.openxmlformats.org/drawingml/2006/main" xmlns:r="http://schemas.openxmlformats.org/officeDocument/2006/relationships" xmlns:p="http://schemas.openxmlformats.org/presentationml/2006/main">
+  <p:cSld>
+    <p:spTree>
+      <p:nvGrpSpPr>
+        <p:cNvPr id="1" name=""/>
+        <p:cNvGrpSpPr/>
+        <p:nvPr/>
+      </p:nvGrpSpPr>
+      <p:grpSpPr>
+        <a:xfrm>
+          <a:off x="0" y="0"/>
+          <a:ext cx="0" cy="0"/>
+          <a:chOff x="0" y="0"/>
+          <a:chExt cx="0" cy="0"/>
+        </a:xfrm>
+      </p:grpSpPr>
+      <p:sp>
+        <p:nvSpPr>
+          <p:cNvPr id="2" name="Titel 1">
+            <a:extLst>
+              <a:ext uri="{FF2B5EF4-FFF2-40B4-BE49-F238E27FC236}">
                 <a16:creationId xmlns:a16="http://schemas.microsoft.com/office/drawing/2014/main" id="{A42CADB6-47CF-834F-B99E-514CE154341D}"/>
               </a:ext>
             </a:extLst>
@@ -19114,7 +19198,7 @@
 </p:sld>
 </file>
 
-<file path=ppt/slides/slide32.xml><?xml version="1.0" encoding="utf-8"?>
+<file path=ppt/slides/slide33.xml><?xml version="1.0" encoding="utf-8"?>
 <p:sld xmlns:a="http://schemas.openxmlformats.org/drawingml/2006/main" xmlns:r="http://schemas.openxmlformats.org/officeDocument/2006/relationships" xmlns:p="http://schemas.openxmlformats.org/presentationml/2006/main">
   <p:cSld>
     <p:spTree>
@@ -19194,7 +19278,7 @@
 </p:sld>
 </file>
 
-<file path=ppt/slides/slide33.xml><?xml version="1.0" encoding="utf-8"?>
+<file path=ppt/slides/slide34.xml><?xml version="1.0" encoding="utf-8"?>
 <p:sld xmlns:a="http://schemas.openxmlformats.org/drawingml/2006/main" xmlns:r="http://schemas.openxmlformats.org/officeDocument/2006/relationships" xmlns:p="http://schemas.openxmlformats.org/presentationml/2006/main">
   <p:cSld>
     <p:spTree>

</xml_diff>